<commit_message>
Minor fixes on "17. Sorting and Searching Algorithms" slides
</commit_message>
<xml_diff>
--- a/Courses/Software-Sciences/Module-2-DS-and-Algo-New/17-Sorting-and-Searching-Algorithms/17-Sorting-and-Searching-Algorithms.pptx
+++ b/Courses/Software-Sciences/Module-2-DS-and-Algo-New/17-Sorting-and-Searching-Algorithms/17-Sorting-and-Searching-Algorithms.pptx
@@ -160,23 +160,11 @@
             <p14:sldId id="506"/>
             <p14:sldId id="507"/>
             <p14:sldId id="508"/>
-          </p14:sldIdLst>
-        </p14:section>
-        <p14:section name="Selection" id="{1DF14879-D508-4867-91EE-7C1BE224C85C}">
-          <p14:sldIdLst>
             <p14:sldId id="632"/>
             <p14:sldId id="631"/>
             <p14:sldId id="634"/>
-          </p14:sldIdLst>
-        </p14:section>
-        <p14:section name="Bubble" id="{DE86DDEF-8198-422A-8662-695FA66C098F}">
-          <p14:sldIdLst>
             <p14:sldId id="509"/>
             <p14:sldId id="547"/>
-          </p14:sldIdLst>
-        </p14:section>
-        <p14:section name="Insertion" id="{3CF8EEBE-7D36-48F7-9A04-138A5BE4F266}">
-          <p14:sldIdLst>
             <p14:sldId id="570"/>
             <p14:sldId id="614"/>
           </p14:sldIdLst>
@@ -184,16 +172,8 @@
         <p14:section name="Сложни алгоритми за сортиране" id="{0BB071EA-B568-47EE-936C-E4529D5A2987}">
           <p14:sldIdLst>
             <p14:sldId id="576"/>
-          </p14:sldIdLst>
-        </p14:section>
-        <p14:section name="QuickSort" id="{A97C155C-35AF-428C-8E99-E767F99B9568}">
-          <p14:sldIdLst>
             <p14:sldId id="579"/>
             <p14:sldId id="628"/>
-          </p14:sldIdLst>
-        </p14:section>
-        <p14:section name="MergeSort" id="{87162447-3547-4356-9D4C-3973A2C9FBAC}">
-          <p14:sldIdLst>
             <p14:sldId id="577"/>
             <p14:sldId id="578"/>
             <p14:sldId id="582"/>
@@ -205,7 +185,7 @@
             <p14:sldId id="630"/>
           </p14:sldIdLst>
         </p14:section>
-        <p14:section name="Алгоритми за сортиране" id="{09593201-5C06-4EC1-A8C7-DD0B83249B69}">
+        <p14:section name="Алгоритми за търсене" id="{09593201-5C06-4EC1-A8C7-DD0B83249B69}">
           <p14:sldIdLst>
             <p14:sldId id="635"/>
             <p14:sldId id="636"/>
@@ -347,7 +327,7 @@
           <a:p>
             <a:fld id="{4E087215-0C8F-4762-A664-737A353EC9A4}" type="datetimeFigureOut">
               <a:rPr lang="bg-BG" smtClean="0"/>
-              <a:t>20.3.2023 г.</a:t>
+              <a:t>6.04.23 г.</a:t>
             </a:fld>
             <a:endParaRPr lang="bg-BG" dirty="0"/>
           </a:p>
@@ -538,7 +518,7 @@
           <a:p>
             <a:fld id="{72D84649-876A-46C9-8472-14CB09C070D8}" type="datetimeFigureOut">
               <a:rPr lang="en-US" smtClean="0"/>
-              <a:t>3/20/2023</a:t>
+              <a:t>4/6/23</a:t>
             </a:fld>
             <a:endParaRPr lang="en-US" dirty="0"/>
           </a:p>
@@ -1539,135 +1519,28 @@
           <a:bodyPr/>
           <a:lstStyle/>
           <a:p>
-            <a:endParaRPr lang="en-US" dirty="0"/>
+            <a:endParaRPr lang="en-BG" dirty="0"/>
           </a:p>
         </p:txBody>
       </p:sp>
       <p:sp>
         <p:nvSpPr>
-          <p:cNvPr id="7" name="Slide Number Placeholder 5">
-            <a:extLst>
-              <a:ext uri="{FF2B5EF4-FFF2-40B4-BE49-F238E27FC236}">
-                <a16:creationId xmlns:a16="http://schemas.microsoft.com/office/drawing/2014/main" id="{E65F1CA9-65DC-416B-8882-B3A5E415CE67}"/>
-              </a:ext>
-            </a:extLst>
-          </p:cNvPr>
-          <p:cNvSpPr txBox="1">
-            <a:spLocks/>
+          <p:cNvPr id="4" name="Slide Number Placeholder 3"/>
+          <p:cNvSpPr>
+            <a:spLocks noGrp="1"/>
           </p:cNvSpPr>
-          <p:nvPr/>
+          <p:nvPr>
+            <p:ph type="sldNum" sz="quarter" idx="5"/>
+          </p:nvPr>
         </p:nvSpPr>
-        <p:spPr>
-          <a:xfrm>
-            <a:off x="6488999" y="8847000"/>
-            <a:ext cx="367414" cy="297000"/>
-          </a:xfrm>
-          <a:prstGeom prst="rect">
-            <a:avLst/>
-          </a:prstGeom>
-        </p:spPr>
+        <p:spPr/>
         <p:txBody>
-          <a:bodyPr vert="horz" lIns="91440" tIns="45720" rIns="91440" bIns="45720" rtlCol="0" anchor="b"/>
-          <a:lstStyle>
-            <a:defPPr>
-              <a:defRPr lang="en-US"/>
-            </a:defPPr>
-            <a:lvl1pPr marL="0" algn="r" defTabSz="914400" rtl="0" eaLnBrk="1" latinLnBrk="0" hangingPunct="1">
-              <a:defRPr sz="1200" kern="1200">
-                <a:solidFill>
-                  <a:schemeClr val="tx1"/>
-                </a:solidFill>
-                <a:latin typeface="+mn-lt"/>
-                <a:ea typeface="+mn-ea"/>
-                <a:cs typeface="+mn-cs"/>
-              </a:defRPr>
-            </a:lvl1pPr>
-            <a:lvl2pPr marL="457200" algn="l" defTabSz="914400" rtl="0" eaLnBrk="1" latinLnBrk="0" hangingPunct="1">
-              <a:defRPr sz="1800" kern="1200">
-                <a:solidFill>
-                  <a:schemeClr val="tx1"/>
-                </a:solidFill>
-                <a:latin typeface="+mn-lt"/>
-                <a:ea typeface="+mn-ea"/>
-                <a:cs typeface="+mn-cs"/>
-              </a:defRPr>
-            </a:lvl2pPr>
-            <a:lvl3pPr marL="914400" algn="l" defTabSz="914400" rtl="0" eaLnBrk="1" latinLnBrk="0" hangingPunct="1">
-              <a:defRPr sz="1800" kern="1200">
-                <a:solidFill>
-                  <a:schemeClr val="tx1"/>
-                </a:solidFill>
-                <a:latin typeface="+mn-lt"/>
-                <a:ea typeface="+mn-ea"/>
-                <a:cs typeface="+mn-cs"/>
-              </a:defRPr>
-            </a:lvl3pPr>
-            <a:lvl4pPr marL="1371600" algn="l" defTabSz="914400" rtl="0" eaLnBrk="1" latinLnBrk="0" hangingPunct="1">
-              <a:defRPr sz="1800" kern="1200">
-                <a:solidFill>
-                  <a:schemeClr val="tx1"/>
-                </a:solidFill>
-                <a:latin typeface="+mn-lt"/>
-                <a:ea typeface="+mn-ea"/>
-                <a:cs typeface="+mn-cs"/>
-              </a:defRPr>
-            </a:lvl4pPr>
-            <a:lvl5pPr marL="1828800" algn="l" defTabSz="914400" rtl="0" eaLnBrk="1" latinLnBrk="0" hangingPunct="1">
-              <a:defRPr sz="1800" kern="1200">
-                <a:solidFill>
-                  <a:schemeClr val="tx1"/>
-                </a:solidFill>
-                <a:latin typeface="+mn-lt"/>
-                <a:ea typeface="+mn-ea"/>
-                <a:cs typeface="+mn-cs"/>
-              </a:defRPr>
-            </a:lvl5pPr>
-            <a:lvl6pPr marL="2286000" algn="l" defTabSz="914400" rtl="0" eaLnBrk="1" latinLnBrk="0" hangingPunct="1">
-              <a:defRPr sz="1800" kern="1200">
-                <a:solidFill>
-                  <a:schemeClr val="tx1"/>
-                </a:solidFill>
-                <a:latin typeface="+mn-lt"/>
-                <a:ea typeface="+mn-ea"/>
-                <a:cs typeface="+mn-cs"/>
-              </a:defRPr>
-            </a:lvl6pPr>
-            <a:lvl7pPr marL="2743200" algn="l" defTabSz="914400" rtl="0" eaLnBrk="1" latinLnBrk="0" hangingPunct="1">
-              <a:defRPr sz="1800" kern="1200">
-                <a:solidFill>
-                  <a:schemeClr val="tx1"/>
-                </a:solidFill>
-                <a:latin typeface="+mn-lt"/>
-                <a:ea typeface="+mn-ea"/>
-                <a:cs typeface="+mn-cs"/>
-              </a:defRPr>
-            </a:lvl7pPr>
-            <a:lvl8pPr marL="3200400" algn="l" defTabSz="914400" rtl="0" eaLnBrk="1" latinLnBrk="0" hangingPunct="1">
-              <a:defRPr sz="1800" kern="1200">
-                <a:solidFill>
-                  <a:schemeClr val="tx1"/>
-                </a:solidFill>
-                <a:latin typeface="+mn-lt"/>
-                <a:ea typeface="+mn-ea"/>
-                <a:cs typeface="+mn-cs"/>
-              </a:defRPr>
-            </a:lvl8pPr>
-            <a:lvl9pPr marL="3657600" algn="l" defTabSz="914400" rtl="0" eaLnBrk="1" latinLnBrk="0" hangingPunct="1">
-              <a:defRPr sz="1800" kern="1200">
-                <a:solidFill>
-                  <a:schemeClr val="tx1"/>
-                </a:solidFill>
-                <a:latin typeface="+mn-lt"/>
-                <a:ea typeface="+mn-ea"/>
-                <a:cs typeface="+mn-cs"/>
-              </a:defRPr>
-            </a:lvl9pPr>
-          </a:lstStyle>
-          <a:p>
-            <a:fld id="{3EBA5BD7-F043-4D1B-AA17-CD412FC534DE}" type="slidenum">
+          <a:bodyPr/>
+          <a:lstStyle/>
+          <a:p>
+            <a:fld id="{2BF067CD-8E6B-4360-9AA8-C5DF2A48A6D1}" type="slidenum">
               <a:rPr lang="en-US" smtClean="0"/>
-              <a:pPr/>
-              <a:t>33</a:t>
+              <a:t>16</a:t>
             </a:fld>
             <a:endParaRPr lang="en-US" dirty="0"/>
           </a:p>
@@ -1675,13 +1548,7 @@
       </p:sp>
       <p:sp>
         <p:nvSpPr>
-          <p:cNvPr id="8" name="Footer Placeholder 7">
-            <a:extLst>
-              <a:ext uri="{FF2B5EF4-FFF2-40B4-BE49-F238E27FC236}">
-                <a16:creationId xmlns:a16="http://schemas.microsoft.com/office/drawing/2014/main" id="{5518D902-80A0-49A6-8525-091756587475}"/>
-              </a:ext>
-            </a:extLst>
-          </p:cNvPr>
+          <p:cNvPr id="5" name="Footer Placeholder 4"/>
           <p:cNvSpPr>
             <a:spLocks noGrp="1"/>
           </p:cNvSpPr>
@@ -1689,44 +1556,33 @@
             <p:ph type="ftr" sz="quarter" idx="4"/>
           </p:nvPr>
         </p:nvSpPr>
-        <p:spPr>
-          <a:xfrm>
-            <a:off x="-1" y="8847000"/>
-            <a:ext cx="6488999" cy="297000"/>
-          </a:xfrm>
-          <a:prstGeom prst="rect">
-            <a:avLst/>
-          </a:prstGeom>
-        </p:spPr>
+        <p:spPr/>
         <p:txBody>
-          <a:bodyPr vert="horz" lIns="91440" tIns="45720" rIns="91440" bIns="45720" rtlCol="0" anchor="b"/>
-          <a:lstStyle>
-            <a:lvl1pPr algn="l">
-              <a:defRPr sz="1100"/>
-            </a:lvl1pPr>
-          </a:lstStyle>
-          <a:p>
-            <a:r>
-              <a:rPr lang="en-US" dirty="0"/>
+          <a:bodyPr/>
+          <a:lstStyle/>
+          <a:p>
+            <a:r>
+              <a:rPr lang="en-US"/>
               <a:t>© SoftUni – </a:t>
             </a:r>
             <a:r>
-              <a:rPr lang="en-US" u="sng" dirty="0">
+              <a:rPr lang="en-US" u="sng">
                 <a:hlinkClick r:id="rId3"/>
               </a:rPr>
               <a:t>https://softuni.org</a:t>
             </a:r>
             <a:r>
-              <a:rPr lang="en-US" dirty="0"/>
+              <a:rPr lang="en-US"/>
               <a:t>. Copyrighted document. Unauthorized copy or reproduction is not permitted.</a:t>
             </a:r>
+            <a:endParaRPr lang="en-US" dirty="0"/>
           </a:p>
         </p:txBody>
       </p:sp>
     </p:spTree>
     <p:extLst>
       <p:ext uri="{BB962C8B-B14F-4D97-AF65-F5344CB8AC3E}">
-        <p14:creationId xmlns:p14="http://schemas.microsoft.com/office/powerpoint/2010/main" val="764684768"/>
+        <p14:creationId xmlns:p14="http://schemas.microsoft.com/office/powerpoint/2010/main" val="1345870971"/>
       </p:ext>
     </p:extLst>
   </p:cSld>
@@ -1789,6 +1645,247 @@
           <p:cNvPr id="7" name="Slide Number Placeholder 5">
             <a:extLst>
               <a:ext uri="{FF2B5EF4-FFF2-40B4-BE49-F238E27FC236}">
+                <a16:creationId xmlns:a16="http://schemas.microsoft.com/office/drawing/2014/main" id="{E65F1CA9-65DC-416B-8882-B3A5E415CE67}"/>
+              </a:ext>
+            </a:extLst>
+          </p:cNvPr>
+          <p:cNvSpPr txBox="1">
+            <a:spLocks/>
+          </p:cNvSpPr>
+          <p:nvPr/>
+        </p:nvSpPr>
+        <p:spPr>
+          <a:xfrm>
+            <a:off x="6488999" y="8847000"/>
+            <a:ext cx="367414" cy="297000"/>
+          </a:xfrm>
+          <a:prstGeom prst="rect">
+            <a:avLst/>
+          </a:prstGeom>
+        </p:spPr>
+        <p:txBody>
+          <a:bodyPr vert="horz" lIns="91440" tIns="45720" rIns="91440" bIns="45720" rtlCol="0" anchor="b"/>
+          <a:lstStyle>
+            <a:defPPr>
+              <a:defRPr lang="en-US"/>
+            </a:defPPr>
+            <a:lvl1pPr marL="0" algn="r" defTabSz="914400" rtl="0" eaLnBrk="1" latinLnBrk="0" hangingPunct="1">
+              <a:defRPr sz="1200" kern="1200">
+                <a:solidFill>
+                  <a:schemeClr val="tx1"/>
+                </a:solidFill>
+                <a:latin typeface="+mn-lt"/>
+                <a:ea typeface="+mn-ea"/>
+                <a:cs typeface="+mn-cs"/>
+              </a:defRPr>
+            </a:lvl1pPr>
+            <a:lvl2pPr marL="457200" algn="l" defTabSz="914400" rtl="0" eaLnBrk="1" latinLnBrk="0" hangingPunct="1">
+              <a:defRPr sz="1800" kern="1200">
+                <a:solidFill>
+                  <a:schemeClr val="tx1"/>
+                </a:solidFill>
+                <a:latin typeface="+mn-lt"/>
+                <a:ea typeface="+mn-ea"/>
+                <a:cs typeface="+mn-cs"/>
+              </a:defRPr>
+            </a:lvl2pPr>
+            <a:lvl3pPr marL="914400" algn="l" defTabSz="914400" rtl="0" eaLnBrk="1" latinLnBrk="0" hangingPunct="1">
+              <a:defRPr sz="1800" kern="1200">
+                <a:solidFill>
+                  <a:schemeClr val="tx1"/>
+                </a:solidFill>
+                <a:latin typeface="+mn-lt"/>
+                <a:ea typeface="+mn-ea"/>
+                <a:cs typeface="+mn-cs"/>
+              </a:defRPr>
+            </a:lvl3pPr>
+            <a:lvl4pPr marL="1371600" algn="l" defTabSz="914400" rtl="0" eaLnBrk="1" latinLnBrk="0" hangingPunct="1">
+              <a:defRPr sz="1800" kern="1200">
+                <a:solidFill>
+                  <a:schemeClr val="tx1"/>
+                </a:solidFill>
+                <a:latin typeface="+mn-lt"/>
+                <a:ea typeface="+mn-ea"/>
+                <a:cs typeface="+mn-cs"/>
+              </a:defRPr>
+            </a:lvl4pPr>
+            <a:lvl5pPr marL="1828800" algn="l" defTabSz="914400" rtl="0" eaLnBrk="1" latinLnBrk="0" hangingPunct="1">
+              <a:defRPr sz="1800" kern="1200">
+                <a:solidFill>
+                  <a:schemeClr val="tx1"/>
+                </a:solidFill>
+                <a:latin typeface="+mn-lt"/>
+                <a:ea typeface="+mn-ea"/>
+                <a:cs typeface="+mn-cs"/>
+              </a:defRPr>
+            </a:lvl5pPr>
+            <a:lvl6pPr marL="2286000" algn="l" defTabSz="914400" rtl="0" eaLnBrk="1" latinLnBrk="0" hangingPunct="1">
+              <a:defRPr sz="1800" kern="1200">
+                <a:solidFill>
+                  <a:schemeClr val="tx1"/>
+                </a:solidFill>
+                <a:latin typeface="+mn-lt"/>
+                <a:ea typeface="+mn-ea"/>
+                <a:cs typeface="+mn-cs"/>
+              </a:defRPr>
+            </a:lvl6pPr>
+            <a:lvl7pPr marL="2743200" algn="l" defTabSz="914400" rtl="0" eaLnBrk="1" latinLnBrk="0" hangingPunct="1">
+              <a:defRPr sz="1800" kern="1200">
+                <a:solidFill>
+                  <a:schemeClr val="tx1"/>
+                </a:solidFill>
+                <a:latin typeface="+mn-lt"/>
+                <a:ea typeface="+mn-ea"/>
+                <a:cs typeface="+mn-cs"/>
+              </a:defRPr>
+            </a:lvl7pPr>
+            <a:lvl8pPr marL="3200400" algn="l" defTabSz="914400" rtl="0" eaLnBrk="1" latinLnBrk="0" hangingPunct="1">
+              <a:defRPr sz="1800" kern="1200">
+                <a:solidFill>
+                  <a:schemeClr val="tx1"/>
+                </a:solidFill>
+                <a:latin typeface="+mn-lt"/>
+                <a:ea typeface="+mn-ea"/>
+                <a:cs typeface="+mn-cs"/>
+              </a:defRPr>
+            </a:lvl8pPr>
+            <a:lvl9pPr marL="3657600" algn="l" defTabSz="914400" rtl="0" eaLnBrk="1" latinLnBrk="0" hangingPunct="1">
+              <a:defRPr sz="1800" kern="1200">
+                <a:solidFill>
+                  <a:schemeClr val="tx1"/>
+                </a:solidFill>
+                <a:latin typeface="+mn-lt"/>
+                <a:ea typeface="+mn-ea"/>
+                <a:cs typeface="+mn-cs"/>
+              </a:defRPr>
+            </a:lvl9pPr>
+          </a:lstStyle>
+          <a:p>
+            <a:fld id="{3EBA5BD7-F043-4D1B-AA17-CD412FC534DE}" type="slidenum">
+              <a:rPr lang="en-US" smtClean="0"/>
+              <a:pPr/>
+              <a:t>33</a:t>
+            </a:fld>
+            <a:endParaRPr lang="en-US" dirty="0"/>
+          </a:p>
+        </p:txBody>
+      </p:sp>
+      <p:sp>
+        <p:nvSpPr>
+          <p:cNvPr id="8" name="Footer Placeholder 7">
+            <a:extLst>
+              <a:ext uri="{FF2B5EF4-FFF2-40B4-BE49-F238E27FC236}">
+                <a16:creationId xmlns:a16="http://schemas.microsoft.com/office/drawing/2014/main" id="{5518D902-80A0-49A6-8525-091756587475}"/>
+              </a:ext>
+            </a:extLst>
+          </p:cNvPr>
+          <p:cNvSpPr>
+            <a:spLocks noGrp="1"/>
+          </p:cNvSpPr>
+          <p:nvPr>
+            <p:ph type="ftr" sz="quarter" idx="4"/>
+          </p:nvPr>
+        </p:nvSpPr>
+        <p:spPr>
+          <a:xfrm>
+            <a:off x="-1" y="8847000"/>
+            <a:ext cx="6488999" cy="297000"/>
+          </a:xfrm>
+          <a:prstGeom prst="rect">
+            <a:avLst/>
+          </a:prstGeom>
+        </p:spPr>
+        <p:txBody>
+          <a:bodyPr vert="horz" lIns="91440" tIns="45720" rIns="91440" bIns="45720" rtlCol="0" anchor="b"/>
+          <a:lstStyle>
+            <a:lvl1pPr algn="l">
+              <a:defRPr sz="1100"/>
+            </a:lvl1pPr>
+          </a:lstStyle>
+          <a:p>
+            <a:r>
+              <a:rPr lang="en-US" dirty="0"/>
+              <a:t>© SoftUni – </a:t>
+            </a:r>
+            <a:r>
+              <a:rPr lang="en-US" u="sng" dirty="0">
+                <a:hlinkClick r:id="rId3"/>
+              </a:rPr>
+              <a:t>https://softuni.org</a:t>
+            </a:r>
+            <a:r>
+              <a:rPr lang="en-US" dirty="0"/>
+              <a:t>. Copyrighted document. Unauthorized copy or reproduction is not permitted.</a:t>
+            </a:r>
+          </a:p>
+        </p:txBody>
+      </p:sp>
+    </p:spTree>
+    <p:extLst>
+      <p:ext uri="{BB962C8B-B14F-4D97-AF65-F5344CB8AC3E}">
+        <p14:creationId xmlns:p14="http://schemas.microsoft.com/office/powerpoint/2010/main" val="764684768"/>
+      </p:ext>
+    </p:extLst>
+  </p:cSld>
+  <p:clrMapOvr>
+    <a:masterClrMapping/>
+  </p:clrMapOvr>
+</p:notes>
+</file>
+
+<file path=ppt/notesSlides/notesSlide7.xml><?xml version="1.0" encoding="utf-8"?>
+<p:notes xmlns:a="http://schemas.openxmlformats.org/drawingml/2006/main" xmlns:r="http://schemas.openxmlformats.org/officeDocument/2006/relationships" xmlns:p="http://schemas.openxmlformats.org/presentationml/2006/main">
+  <p:cSld>
+    <p:spTree>
+      <p:nvGrpSpPr>
+        <p:cNvPr id="1" name=""/>
+        <p:cNvGrpSpPr/>
+        <p:nvPr/>
+      </p:nvGrpSpPr>
+      <p:grpSpPr>
+        <a:xfrm>
+          <a:off x="0" y="0"/>
+          <a:ext cx="0" cy="0"/>
+          <a:chOff x="0" y="0"/>
+          <a:chExt cx="0" cy="0"/>
+        </a:xfrm>
+      </p:grpSpPr>
+      <p:sp>
+        <p:nvSpPr>
+          <p:cNvPr id="2" name="Slide Image Placeholder 1"/>
+          <p:cNvSpPr>
+            <a:spLocks noGrp="1" noRot="1" noChangeAspect="1"/>
+          </p:cNvSpPr>
+          <p:nvPr>
+            <p:ph type="sldImg"/>
+          </p:nvPr>
+        </p:nvSpPr>
+        <p:spPr/>
+      </p:sp>
+      <p:sp>
+        <p:nvSpPr>
+          <p:cNvPr id="3" name="Notes Placeholder 2"/>
+          <p:cNvSpPr>
+            <a:spLocks noGrp="1"/>
+          </p:cNvSpPr>
+          <p:nvPr>
+            <p:ph type="body" idx="1"/>
+          </p:nvPr>
+        </p:nvSpPr>
+        <p:spPr/>
+        <p:txBody>
+          <a:bodyPr/>
+          <a:lstStyle/>
+          <a:p>
+            <a:endParaRPr lang="en-US" dirty="0"/>
+          </a:p>
+        </p:txBody>
+      </p:sp>
+      <p:sp>
+        <p:nvSpPr>
+          <p:cNvPr id="7" name="Slide Number Placeholder 5">
+            <a:extLst>
+              <a:ext uri="{FF2B5EF4-FFF2-40B4-BE49-F238E27FC236}">
                 <a16:creationId xmlns:a16="http://schemas.microsoft.com/office/drawing/2014/main" id="{5049B984-F964-47FF-8179-0A3007CE21CD}"/>
               </a:ext>
             </a:extLst>
@@ -1977,7 +2074,7 @@
 </p:notes>
 </file>
 
-<file path=ppt/notesSlides/notesSlide7.xml><?xml version="1.0" encoding="utf-8"?>
+<file path=ppt/notesSlides/notesSlide8.xml><?xml version="1.0" encoding="utf-8"?>
 <p:notes xmlns:a="http://schemas.openxmlformats.org/drawingml/2006/main" xmlns:r="http://schemas.openxmlformats.org/officeDocument/2006/relationships" xmlns:p="http://schemas.openxmlformats.org/presentationml/2006/main">
   <p:cSld>
     <p:spTree>
@@ -8982,9 +9079,22 @@
           <a:bodyPr/>
           <a:lstStyle/>
           <a:p>
+            <a:pPr>
+              <a:buClr>
+                <a:schemeClr val="tx1"/>
+              </a:buClr>
+            </a:pPr>
+            <a:r>
+              <a:rPr lang="bg-BG" b="1" dirty="0">
+                <a:solidFill>
+                  <a:schemeClr val="bg1"/>
+                </a:solidFill>
+              </a:rPr>
+              <a:t>Размяна</a:t>
+            </a:r>
             <a:r>
               <a:rPr lang="bg-BG" dirty="0"/>
-              <a:t>Размяна на два елемента</a:t>
+              <a:t> на два елемента</a:t>
             </a:r>
             <a:r>
               <a:rPr lang="en-US" dirty="0"/>
@@ -9023,7 +9133,7 @@
             </a:r>
             <a:r>
               <a:rPr lang="bg-BG" dirty="0"/>
-              <a:t> Код</a:t>
+              <a:t> код</a:t>
             </a:r>
             <a:endParaRPr lang="en-US" dirty="0"/>
           </a:p>
@@ -9489,8 +9599,8 @@
         </p:nvSpPr>
         <p:spPr>
           <a:xfrm>
-            <a:off x="1552184" y="999634"/>
-            <a:ext cx="7161424" cy="5545145"/>
+            <a:off x="1552184" y="898855"/>
+            <a:ext cx="7018816" cy="5545145"/>
           </a:xfrm>
         </p:spPr>
         <p:txBody>
@@ -9508,7 +9618,7 @@
               </a:buClr>
             </a:pPr>
             <a:r>
-              <a:rPr lang="en-US" sz="3399" b="1" dirty="0">
+              <a:rPr lang="en-US" sz="2900" b="1" dirty="0">
                 <a:solidFill>
                   <a:schemeClr val="bg1"/>
                 </a:solidFill>
@@ -9516,22 +9626,22 @@
               <a:t>Bubble sort </a:t>
             </a:r>
             <a:r>
-              <a:rPr lang="en-US" sz="3399" dirty="0"/>
+              <a:rPr lang="en-US" sz="2900" dirty="0"/>
               <a:t>– </a:t>
             </a:r>
             <a:r>
-              <a:rPr lang="bg-BG" sz="3399" dirty="0"/>
+              <a:rPr lang="bg-BG" sz="2900" dirty="0"/>
               <a:t>прост</a:t>
             </a:r>
             <a:r>
-              <a:rPr lang="en-US" sz="3399" dirty="0"/>
+              <a:rPr lang="en-US" sz="2900" dirty="0"/>
               <a:t>, </a:t>
             </a:r>
             <a:r>
-              <a:rPr lang="bg-BG" sz="3399" dirty="0"/>
+              <a:rPr lang="bg-BG" sz="2900" dirty="0"/>
               <a:t>но неефективен алгоритъм</a:t>
             </a:r>
-            <a:endParaRPr lang="en-US" sz="3399" dirty="0"/>
+            <a:endParaRPr lang="en-US" sz="2900" dirty="0"/>
           </a:p>
           <a:p>
             <a:pPr>
@@ -9543,10 +9653,22 @@
               </a:buClr>
             </a:pPr>
             <a:r>
-              <a:rPr lang="bg-BG" sz="3399" dirty="0"/>
-              <a:t>Размяна на съседни елементи, когато не са подредени</a:t>
-            </a:r>
-            <a:endParaRPr lang="en-US" sz="3399" dirty="0"/>
+              <a:rPr lang="bg-BG" sz="2900" dirty="0"/>
+              <a:t>Размяна на </a:t>
+            </a:r>
+            <a:r>
+              <a:rPr lang="bg-BG" sz="2900" b="1" dirty="0">
+                <a:solidFill>
+                  <a:schemeClr val="bg1"/>
+                </a:solidFill>
+              </a:rPr>
+              <a:t>съседни елементи</a:t>
+            </a:r>
+            <a:r>
+              <a:rPr lang="bg-BG" sz="2900" dirty="0"/>
+              <a:t>, когато не са подредени</a:t>
+            </a:r>
+            <a:endParaRPr lang="en-US" sz="2900" dirty="0"/>
           </a:p>
           <a:p>
             <a:pPr lvl="1">
@@ -9558,15 +9680,15 @@
               </a:buClr>
             </a:pPr>
             <a:r>
-              <a:rPr lang="bg-BG" sz="2999" dirty="0"/>
+              <a:rPr lang="bg-BG" sz="2900" dirty="0"/>
               <a:t>Памет</a:t>
             </a:r>
             <a:r>
-              <a:rPr lang="en-US" sz="2999" dirty="0"/>
+              <a:rPr lang="en-US" sz="2900" dirty="0"/>
               <a:t>: </a:t>
             </a:r>
             <a:r>
-              <a:rPr lang="en-US" sz="2999" b="1" dirty="0">
+              <a:rPr lang="en-US" sz="2900" b="1" dirty="0">
                 <a:solidFill>
                   <a:schemeClr val="bg1"/>
                 </a:solidFill>
@@ -9574,11 +9696,11 @@
               <a:t>O(1)</a:t>
             </a:r>
             <a:r>
-              <a:rPr lang="en-US" sz="2999" dirty="0"/>
+              <a:rPr lang="en-US" sz="2900" dirty="0"/>
               <a:t>,</a:t>
             </a:r>
             <a:r>
-              <a:rPr lang="en-US" sz="2999" b="1" dirty="0">
+              <a:rPr lang="en-US" sz="2900" b="1" dirty="0">
                 <a:solidFill>
                   <a:schemeClr val="bg1"/>
                 </a:solidFill>
@@ -9586,15 +9708,15 @@
               <a:t> </a:t>
             </a:r>
             <a:r>
-              <a:rPr lang="bg-BG" sz="2999" dirty="0"/>
+              <a:rPr lang="bg-BG" sz="2900" dirty="0"/>
               <a:t>Време</a:t>
             </a:r>
             <a:r>
-              <a:rPr lang="en-US" sz="2999" dirty="0"/>
+              <a:rPr lang="en-US" sz="2900" dirty="0"/>
               <a:t>: </a:t>
             </a:r>
             <a:r>
-              <a:rPr lang="en-US" sz="2999" b="1" dirty="0">
+              <a:rPr lang="en-US" sz="2900" b="1" dirty="0">
                 <a:solidFill>
                   <a:schemeClr val="bg1"/>
                 </a:solidFill>
@@ -9602,7 +9724,7 @@
               <a:t>O(n</a:t>
             </a:r>
             <a:r>
-              <a:rPr lang="en-US" sz="2999" b="1" baseline="30000" dirty="0">
+              <a:rPr lang="en-US" sz="2900" b="1" baseline="30000" dirty="0">
                 <a:solidFill>
                   <a:schemeClr val="bg1"/>
                 </a:solidFill>
@@ -9610,7 +9732,7 @@
               <a:t>2</a:t>
             </a:r>
             <a:r>
-              <a:rPr lang="en-US" sz="2999" b="1" dirty="0">
+              <a:rPr lang="en-US" sz="2900" b="1" dirty="0">
                 <a:solidFill>
                   <a:schemeClr val="bg1"/>
                 </a:solidFill>
@@ -9618,11 +9740,11 @@
               <a:t>)</a:t>
             </a:r>
             <a:r>
-              <a:rPr lang="en-US" sz="2999" dirty="0"/>
+              <a:rPr lang="en-US" sz="2900" dirty="0"/>
               <a:t>,</a:t>
             </a:r>
             <a:r>
-              <a:rPr lang="en-US" sz="2999" b="1" dirty="0">
+              <a:rPr lang="en-US" sz="2900" b="1" dirty="0">
                 <a:solidFill>
                   <a:schemeClr val="bg1"/>
                 </a:solidFill>
@@ -9630,22 +9752,22 @@
               <a:t> </a:t>
             </a:r>
             <a:r>
-              <a:rPr lang="bg-BG" sz="2999" dirty="0"/>
-              <a:t>Стабилност</a:t>
-            </a:r>
-            <a:r>
-              <a:rPr lang="en-US" sz="2999" dirty="0"/>
+              <a:rPr lang="bg-BG" sz="2900" dirty="0"/>
+              <a:t>Стабилен</a:t>
+            </a:r>
+            <a:r>
+              <a:rPr lang="en-US" sz="2900" dirty="0"/>
               <a:t>: </a:t>
             </a:r>
             <a:r>
-              <a:rPr lang="bg-BG" sz="2999" b="1" dirty="0">
+              <a:rPr lang="bg-BG" sz="2900" b="1" dirty="0">
                 <a:solidFill>
                   <a:schemeClr val="bg1"/>
                 </a:solidFill>
               </a:rPr>
               <a:t>Да</a:t>
             </a:r>
-            <a:endParaRPr lang="en-US" sz="2999" b="1" dirty="0">
+            <a:endParaRPr lang="en-US" sz="2900" b="1" dirty="0">
               <a:solidFill>
                 <a:schemeClr val="bg1"/>
               </a:solidFill>
@@ -9661,18 +9783,18 @@
               </a:buClr>
             </a:pPr>
             <a:r>
-              <a:rPr lang="bg-BG" sz="2999" dirty="0"/>
+              <a:rPr lang="bg-BG" sz="2900" dirty="0"/>
               <a:t>Метод</a:t>
             </a:r>
             <a:r>
-              <a:rPr lang="en-US" sz="2999" dirty="0"/>
+              <a:rPr lang="en-US" sz="2900" dirty="0"/>
               <a:t>: </a:t>
             </a:r>
             <a:r>
-              <a:rPr lang="bg-BG" sz="2999" dirty="0"/>
+              <a:rPr lang="bg-BG" sz="2900" dirty="0"/>
               <a:t>Размяна</a:t>
             </a:r>
-            <a:endParaRPr lang="en-US" sz="2999" dirty="0"/>
+            <a:endParaRPr lang="en-US" sz="2900" dirty="0"/>
           </a:p>
           <a:p>
             <a:pPr lvl="1">
@@ -9684,41 +9806,67 @@
               </a:buClr>
             </a:pPr>
             <a:r>
-              <a:rPr lang="bg-BG" sz="2800" dirty="0"/>
+              <a:rPr lang="bg-BG" sz="2900" dirty="0"/>
               <a:t>Можете да видите визуализацията</a:t>
             </a:r>
             <a:r>
-              <a:rPr lang="en-US" sz="2999" dirty="0"/>
+              <a:rPr lang="en-US" sz="2900" dirty="0"/>
               <a:t>: </a:t>
             </a:r>
             <a:r>
-              <a:rPr lang="en-US" sz="2999" u="sng" dirty="0">
+              <a:rPr lang="en-US" sz="2900" u="sng" dirty="0">
                 <a:hlinkClick r:id="rId3"/>
               </a:rPr>
               <a:t>https://visualgo.net/en/sorting</a:t>
             </a:r>
             <a:r>
-              <a:rPr lang="en-US" sz="2999" dirty="0"/>
+              <a:rPr lang="en-US" sz="2900" dirty="0"/>
               <a:t> </a:t>
             </a:r>
             <a:r>
-              <a:rPr lang="en-US" sz="2999" dirty="0">
+              <a:rPr lang="en-US" sz="2900" dirty="0">
                 <a:sym typeface="Wingdings" panose="05000000000000000000" pitchFamily="2" charset="2"/>
               </a:rPr>
               <a:t></a:t>
             </a:r>
             <a:r>
-              <a:rPr lang="en-US" sz="2999" dirty="0"/>
-              <a:t> choose </a:t>
-            </a:r>
-            <a:r>
-              <a:rPr lang="en-US" sz="2999" b="1" dirty="0"/>
+              <a:rPr lang="bg-BG" sz="2900" dirty="0">
+                <a:sym typeface="Wingdings" panose="05000000000000000000" pitchFamily="2" charset="2"/>
+              </a:rPr>
+              <a:t> </a:t>
+            </a:r>
+            <a:r>
+              <a:rPr lang="bg-BG" sz="2900" dirty="0"/>
+              <a:t>изберете</a:t>
+            </a:r>
+            <a:r>
+              <a:rPr lang="en-US" sz="2900" dirty="0"/>
+              <a:t> </a:t>
+            </a:r>
+            <a:r>
+              <a:rPr lang="en-US" sz="2900" b="1" dirty="0">
+                <a:solidFill>
+                  <a:schemeClr val="bg1"/>
+                </a:solidFill>
+              </a:rPr>
               <a:t>Bubble sort</a:t>
             </a:r>
             <a:r>
-              <a:rPr lang="en-US" sz="2999" dirty="0"/>
-              <a:t>:</a:t>
-            </a:r>
+              <a:rPr lang="en-US" sz="2900" dirty="0"/>
+              <a:t>: </a:t>
+            </a:r>
+            <a:endParaRPr lang="bg-BG" sz="2900" dirty="0"/>
+          </a:p>
+          <a:p>
+            <a:pPr lvl="1">
+              <a:lnSpc>
+                <a:spcPct val="100000"/>
+              </a:lnSpc>
+              <a:buClr>
+                <a:schemeClr val="tx1"/>
+              </a:buClr>
+            </a:pPr>
+            <a:endParaRPr lang="en-US" sz="2900" dirty="0"/>
           </a:p>
         </p:txBody>
       </p:sp>
@@ -9766,7 +9914,7 @@
         </p:blipFill>
         <p:spPr>
           <a:xfrm>
-            <a:off x="2495601" y="6061260"/>
+            <a:off x="2451000" y="6084000"/>
             <a:ext cx="7670499" cy="539859"/>
           </a:xfrm>
           <a:prstGeom prst="rect">
@@ -10285,7 +10433,7 @@
             </a:r>
             <a:r>
               <a:rPr lang="bg-BG" dirty="0"/>
-              <a:t>: Код</a:t>
+              <a:t>: код</a:t>
             </a:r>
             <a:endParaRPr lang="en-US" dirty="0"/>
           </a:p>
@@ -11094,14 +11242,34 @@
             <a:pPr lvl="1"/>
             <a:r>
               <a:rPr lang="bg-BG" sz="3199" dirty="0"/>
-              <a:t>Премества първия несортиран </a:t>
+              <a:t>Премества </a:t>
+            </a:r>
+            <a:r>
+              <a:rPr lang="bg-BG" sz="3199" b="1" dirty="0">
+                <a:solidFill>
+                  <a:schemeClr val="bg1"/>
+                </a:solidFill>
+              </a:rPr>
+              <a:t>първия несортиран </a:t>
             </a:r>
             <a:br>
               <a:rPr lang="bg-BG" sz="3199" dirty="0"/>
             </a:br>
             <a:r>
               <a:rPr lang="bg-BG" sz="3199" dirty="0"/>
-              <a:t>елемент отляво на неговото място</a:t>
+              <a:t>елемент </a:t>
+            </a:r>
+            <a:r>
+              <a:rPr lang="bg-BG" sz="3199" b="1" dirty="0">
+                <a:solidFill>
+                  <a:schemeClr val="bg1"/>
+                </a:solidFill>
+              </a:rPr>
+              <a:t>отляво</a:t>
+            </a:r>
+            <a:r>
+              <a:rPr lang="bg-BG" sz="3199" dirty="0"/>
+              <a:t> на неговото място</a:t>
             </a:r>
             <a:endParaRPr lang="en-US" sz="3199" dirty="0"/>
           </a:p>
@@ -11167,6 +11335,46 @@
               </a:rPr>
               <a:t>)</a:t>
             </a:r>
+            <a:r>
+              <a:rPr lang="bg-BG" sz="3199" dirty="0"/>
+              <a:t>,</a:t>
+            </a:r>
+            <a:r>
+              <a:rPr lang="bg-BG" sz="3199" b="1" dirty="0">
+                <a:solidFill>
+                  <a:schemeClr val="bg1"/>
+                </a:solidFill>
+              </a:rPr>
+              <a:t> </a:t>
+            </a:r>
+            <a:br>
+              <a:rPr lang="bg-BG" sz="3199" b="1" dirty="0">
+                <a:solidFill>
+                  <a:schemeClr val="bg1"/>
+                </a:solidFill>
+              </a:rPr>
+            </a:br>
+            <a:r>
+              <a:rPr lang="bg-BG" sz="3199" dirty="0"/>
+              <a:t>Стабилен</a:t>
+            </a:r>
+            <a:r>
+              <a:rPr lang="en-US" sz="3199" dirty="0"/>
+              <a:t>: </a:t>
+            </a:r>
+            <a:r>
+              <a:rPr lang="bg-BG" sz="3199" b="1" dirty="0">
+                <a:solidFill>
+                  <a:schemeClr val="bg1"/>
+                </a:solidFill>
+              </a:rPr>
+              <a:t>Да</a:t>
+            </a:r>
+            <a:endParaRPr lang="en-US" sz="3199" b="1" dirty="0">
+              <a:solidFill>
+                <a:schemeClr val="bg1"/>
+              </a:solidFill>
+            </a:endParaRPr>
           </a:p>
           <a:p>
             <a:pPr lvl="1">
@@ -11176,7 +11384,7 @@
             </a:pPr>
             <a:r>
               <a:rPr lang="bg-BG" sz="3199" dirty="0"/>
-              <a:t>Стабилност</a:t>
+              <a:t>Метод</a:t>
             </a:r>
             <a:r>
               <a:rPr lang="en-US" sz="3199" dirty="0"/>
@@ -11188,7 +11396,7 @@
                   <a:schemeClr val="bg1"/>
                 </a:solidFill>
               </a:rPr>
-              <a:t>Да</a:t>
+              <a:t>Вмъкване</a:t>
             </a:r>
             <a:endParaRPr lang="en-US" sz="3199" b="1" dirty="0">
               <a:solidFill>
@@ -11203,34 +11411,6 @@
               </a:buClr>
             </a:pPr>
             <a:r>
-              <a:rPr lang="bg-BG" sz="3199" dirty="0"/>
-              <a:t>Метод</a:t>
-            </a:r>
-            <a:r>
-              <a:rPr lang="en-US" sz="3199" dirty="0"/>
-              <a:t>: </a:t>
-            </a:r>
-            <a:r>
-              <a:rPr lang="bg-BG" sz="3199" b="1" dirty="0">
-                <a:solidFill>
-                  <a:schemeClr val="bg1"/>
-                </a:solidFill>
-              </a:rPr>
-              <a:t>Вмъкване</a:t>
-            </a:r>
-            <a:endParaRPr lang="en-US" sz="3199" b="1" dirty="0">
-              <a:solidFill>
-                <a:schemeClr val="bg1"/>
-              </a:solidFill>
-            </a:endParaRPr>
-          </a:p>
-          <a:p>
-            <a:pPr lvl="1">
-              <a:buClr>
-                <a:schemeClr val="tx1"/>
-              </a:buClr>
-            </a:pPr>
-            <a:r>
               <a:rPr lang="bg-BG" dirty="0"/>
               <a:t>Можете да видите визуализацията</a:t>
             </a:r>
@@ -11267,7 +11447,11 @@
               <a:t> </a:t>
             </a:r>
             <a:r>
-              <a:rPr lang="en-US" sz="3199" b="1" dirty="0"/>
+              <a:rPr lang="en-US" sz="3199" b="1" dirty="0">
+                <a:solidFill>
+                  <a:schemeClr val="bg1"/>
+                </a:solidFill>
+              </a:rPr>
               <a:t>Insertion sort</a:t>
             </a:r>
             <a:r>
@@ -11643,64 +11827,15 @@
                                   </p:childTnLst>
                                 </p:cTn>
                               </p:par>
-                            </p:childTnLst>
-                          </p:cTn>
-                        </p:par>
-                      </p:childTnLst>
-                    </p:cTn>
-                  </p:par>
-                  <p:par>
-                    <p:cTn id="19" fill="hold">
-                      <p:stCondLst>
-                        <p:cond delay="indefinite"/>
-                      </p:stCondLst>
-                      <p:childTnLst>
-                        <p:par>
-                          <p:cTn id="20" fill="hold">
-                            <p:stCondLst>
-                              <p:cond delay="0"/>
-                            </p:stCondLst>
-                            <p:childTnLst>
                               <p:par>
-                                <p:cTn id="21" presetID="1" presetClass="entr" presetSubtype="0" fill="hold" nodeType="clickEffect">
+                                <p:cTn id="19" presetID="1" presetClass="entr" presetSubtype="0" fill="hold" nodeType="withEffect">
                                   <p:stCondLst>
                                     <p:cond delay="0"/>
                                   </p:stCondLst>
                                   <p:childTnLst>
                                     <p:set>
                                       <p:cBhvr>
-                                        <p:cTn id="22" dur="1" fill="hold">
-                                          <p:stCondLst>
-                                            <p:cond delay="0"/>
-                                          </p:stCondLst>
-                                        </p:cTn>
-                                        <p:tgtEl>
-                                          <p:spTgt spid="3">
-                                            <p:txEl>
-                                              <p:pRg st="5" end="5"/>
-                                            </p:txEl>
-                                          </p:spTgt>
-                                        </p:tgtEl>
-                                        <p:attrNameLst>
-                                          <p:attrName>style.visibility</p:attrName>
-                                        </p:attrNameLst>
-                                      </p:cBhvr>
-                                      <p:to>
-                                        <p:strVal val="visible"/>
-                                      </p:to>
-                                    </p:set>
-                                  </p:childTnLst>
-                                </p:cTn>
-                              </p:par>
-                              <p:par>
-                                <p:cTn id="23" presetID="1" presetClass="entr" presetSubtype="0" fill="hold" nodeType="withEffect">
-                                  <p:stCondLst>
-                                    <p:cond delay="0"/>
-                                  </p:stCondLst>
-                                  <p:childTnLst>
-                                    <p:set>
-                                      <p:cBhvr>
-                                        <p:cTn id="24" dur="1" fill="hold">
+                                        <p:cTn id="20" dur="1" fill="hold">
                                           <p:stCondLst>
                                             <p:cond delay="0"/>
                                           </p:stCondLst>
@@ -11788,7 +11923,7 @@
             </a:r>
             <a:r>
               <a:rPr lang="bg-BG" dirty="0"/>
-              <a:t>: Код</a:t>
+              <a:t>: код</a:t>
             </a:r>
             <a:endParaRPr lang="en-US" dirty="0"/>
           </a:p>
@@ -12447,6 +12582,47 @@
       </p:grpSpPr>
       <p:sp>
         <p:nvSpPr>
+          <p:cNvPr id="4" name="Subtitle 3">
+            <a:extLst>
+              <a:ext uri="{FF2B5EF4-FFF2-40B4-BE49-F238E27FC236}">
+                <a16:creationId xmlns:a16="http://schemas.microsoft.com/office/drawing/2014/main" id="{1EB9F521-74A3-9C3D-515C-497B95D4E8EA}"/>
+              </a:ext>
+            </a:extLst>
+          </p:cNvPr>
+          <p:cNvSpPr>
+            <a:spLocks noGrp="1"/>
+          </p:cNvSpPr>
+          <p:nvPr>
+            <p:ph type="subTitle" sz="quarter" idx="11"/>
+          </p:nvPr>
+        </p:nvSpPr>
+        <p:spPr/>
+        <p:txBody>
+          <a:bodyPr/>
+          <a:lstStyle/>
+          <a:p>
+            <a:r>
+              <a:rPr lang="en-US" dirty="0" err="1"/>
+              <a:t>QuickSort</a:t>
+            </a:r>
+            <a:r>
+              <a:rPr lang="bg-BG" dirty="0"/>
+              <a:t> и</a:t>
+            </a:r>
+            <a:r>
+              <a:rPr lang="en-US" dirty="0"/>
+              <a:t> </a:t>
+            </a:r>
+            <a:r>
+              <a:rPr lang="en-US" dirty="0" err="1"/>
+              <a:t>MergeSort</a:t>
+            </a:r>
+            <a:endParaRPr lang="en-BG" dirty="0"/>
+          </a:p>
+        </p:txBody>
+      </p:sp>
+      <p:sp>
+        <p:nvSpPr>
           <p:cNvPr id="3" name="Title 2"/>
           <p:cNvSpPr>
             <a:spLocks noGrp="1"/>
@@ -12461,17 +12637,10 @@
           <a:lstStyle/>
           <a:p>
             <a:r>
-              <a:rPr lang="en-US" dirty="0"/>
-              <a:t>QuickSort</a:t>
-            </a:r>
-            <a:r>
               <a:rPr lang="bg-BG" dirty="0"/>
-              <a:t> и</a:t>
-            </a:r>
-            <a:r>
-              <a:rPr lang="en-US" dirty="0"/>
-              <a:t> MergeSort</a:t>
-            </a:r>
+              <a:t>Сложни алгоритми за сортиране</a:t>
+            </a:r>
+            <a:endParaRPr lang="en-US" dirty="0"/>
           </a:p>
         </p:txBody>
       </p:sp>
@@ -12491,7 +12660,6 @@
         </p:nvPicPr>
         <p:blipFill>
           <a:blip r:embed="rId3">
-            <a:lum contrast="100000"/>
             <a:extLst>
               <a:ext uri="{28A0092B-C50C-407E-A947-70E740481C1C}">
                 <a14:useLocalDpi xmlns:a14="http://schemas.microsoft.com/office/drawing/2010/main" val="0"/>
@@ -12507,7 +12675,7 @@
         </p:blipFill>
         <p:spPr>
           <a:xfrm>
-            <a:off x="4521412" y="907196"/>
+            <a:off x="4464512" y="1044000"/>
             <a:ext cx="3262975" cy="3262975"/>
           </a:xfrm>
           <a:prstGeom prst="rect">
@@ -12563,10 +12731,15 @@
             <p:ph type="body" sz="quarter" idx="10"/>
           </p:nvPr>
         </p:nvSpPr>
-        <p:spPr/>
+        <p:spPr>
+          <a:xfrm>
+            <a:off x="1866000" y="858679"/>
+            <a:ext cx="10326000" cy="5546589"/>
+          </a:xfrm>
+        </p:spPr>
         <p:txBody>
           <a:bodyPr>
-            <a:normAutofit lnSpcReduction="10000"/>
+            <a:normAutofit/>
           </a:bodyPr>
           <a:lstStyle/>
           <a:p>
@@ -12576,7 +12749,7 @@
               </a:buClr>
             </a:pPr>
             <a:r>
-              <a:rPr lang="en-US" sz="3599" b="1" noProof="1">
+              <a:rPr lang="en-US" sz="3150" b="1" noProof="1">
                 <a:solidFill>
                   <a:schemeClr val="bg1"/>
                 </a:solidFill>
@@ -12584,14 +12757,14 @@
               <a:t>QuickSort</a:t>
             </a:r>
             <a:r>
-              <a:rPr lang="en-US" sz="3599" dirty="0"/>
+              <a:rPr lang="en-US" sz="3150" dirty="0"/>
               <a:t> – </a:t>
             </a:r>
             <a:r>
-              <a:rPr lang="bg-BG" sz="3599" dirty="0"/>
+              <a:rPr lang="bg-BG" sz="3150" dirty="0"/>
               <a:t>ефективен сортиращ алгоритъм</a:t>
             </a:r>
-            <a:endParaRPr lang="en-US" sz="3599" dirty="0"/>
+            <a:endParaRPr lang="en-US" sz="3150" dirty="0"/>
           </a:p>
           <a:p>
             <a:pPr lvl="1">
@@ -12600,11 +12773,11 @@
               </a:buClr>
             </a:pPr>
             <a:r>
-              <a:rPr lang="bg-BG" sz="3199" dirty="0"/>
+              <a:rPr lang="bg-BG" sz="3150" dirty="0"/>
               <a:t>Избира </a:t>
             </a:r>
             <a:r>
-              <a:rPr lang="bg-BG" sz="3199" b="1" dirty="0">
+              <a:rPr lang="bg-BG" sz="3150" b="1" dirty="0">
                 <a:solidFill>
                   <a:schemeClr val="bg1"/>
                 </a:solidFill>
@@ -12612,14 +12785,62 @@
               <a:t>пивот</a:t>
             </a:r>
             <a:r>
-              <a:rPr lang="en-US" sz="3199" dirty="0"/>
+              <a:rPr lang="en-US" sz="3150" dirty="0"/>
               <a:t>; </a:t>
             </a:r>
             <a:r>
-              <a:rPr lang="bg-BG" sz="3199" dirty="0"/>
-              <a:t>премества малките елементи отляво и големите елементи отдясно; сортира отляво и отдясно</a:t>
-            </a:r>
-            <a:endParaRPr lang="en-US" sz="3199" dirty="0"/>
+              <a:rPr lang="bg-BG" sz="3150" dirty="0"/>
+              <a:t>премества </a:t>
+            </a:r>
+            <a:r>
+              <a:rPr lang="bg-BG" sz="3150" b="1" dirty="0">
+                <a:solidFill>
+                  <a:schemeClr val="bg1"/>
+                </a:solidFill>
+              </a:rPr>
+              <a:t>малките</a:t>
+            </a:r>
+            <a:r>
+              <a:rPr lang="bg-BG" sz="3150" dirty="0"/>
+              <a:t> елементи </a:t>
+            </a:r>
+            <a:r>
+              <a:rPr lang="bg-BG" sz="3150" b="1" dirty="0">
+                <a:solidFill>
+                  <a:schemeClr val="bg1"/>
+                </a:solidFill>
+              </a:rPr>
+              <a:t>отляво</a:t>
+            </a:r>
+            <a:r>
+              <a:rPr lang="bg-BG" sz="3150" dirty="0"/>
+              <a:t> и </a:t>
+            </a:r>
+            <a:r>
+              <a:rPr lang="bg-BG" sz="3150" b="1" dirty="0">
+                <a:solidFill>
+                  <a:schemeClr val="bg1"/>
+                </a:solidFill>
+              </a:rPr>
+              <a:t>големите</a:t>
+            </a:r>
+            <a:r>
+              <a:rPr lang="bg-BG" sz="3150" dirty="0"/>
+              <a:t> елементи </a:t>
+            </a:r>
+            <a:r>
+              <a:rPr lang="bg-BG" sz="3150" b="1" dirty="0">
+                <a:solidFill>
+                  <a:schemeClr val="bg1"/>
+                </a:solidFill>
+              </a:rPr>
+              <a:t>отдясно</a:t>
+            </a:r>
+            <a:r>
+              <a:rPr lang="bg-BG" sz="3150" dirty="0"/>
+              <a:t>; сортира отляво и отдясно</a:t>
+            </a:r>
+            <a:endParaRPr lang="en-US" sz="3150" dirty="0"/>
           </a:p>
           <a:p>
             <a:pPr lvl="1">
@@ -12628,15 +12849,15 @@
               </a:buClr>
             </a:pPr>
             <a:r>
-              <a:rPr lang="bg-BG" sz="3199" dirty="0"/>
+              <a:rPr lang="bg-BG" sz="3150" dirty="0"/>
               <a:t>Памет</a:t>
             </a:r>
             <a:r>
-              <a:rPr lang="en-US" sz="3199" dirty="0"/>
+              <a:rPr lang="en-US" sz="3150" dirty="0"/>
               <a:t>: </a:t>
             </a:r>
             <a:r>
-              <a:rPr lang="en-US" sz="3199" b="1" dirty="0">
+              <a:rPr lang="en-US" sz="3150" b="1" dirty="0">
                 <a:solidFill>
                   <a:schemeClr val="bg1"/>
                 </a:solidFill>
@@ -12644,34 +12865,34 @@
               <a:t>O(log(n)) </a:t>
             </a:r>
             <a:r>
-              <a:rPr lang="bg-BG" sz="3199" dirty="0"/>
+              <a:rPr lang="bg-BG" sz="3150" dirty="0"/>
               <a:t>пространство в стека </a:t>
             </a:r>
             <a:r>
-              <a:rPr lang="en-US" sz="3199" dirty="0"/>
+              <a:rPr lang="en-US" sz="3150" dirty="0"/>
               <a:t>(</a:t>
             </a:r>
             <a:r>
-              <a:rPr lang="bg-BG" sz="3199" dirty="0"/>
+              <a:rPr lang="bg-BG" sz="3150" dirty="0"/>
               <a:t>рекурсивно</a:t>
             </a:r>
             <a:r>
-              <a:rPr lang="en-US" sz="3199" dirty="0"/>
+              <a:rPr lang="en-US" sz="3150" dirty="0"/>
               <a:t>),</a:t>
             </a:r>
             <a:br>
-              <a:rPr lang="en-US" sz="3199" dirty="0"/>
+              <a:rPr lang="en-US" sz="3150" dirty="0"/>
             </a:br>
             <a:r>
-              <a:rPr lang="bg-BG" sz="3199" dirty="0"/>
+              <a:rPr lang="bg-BG" sz="3150" dirty="0"/>
               <a:t>Време</a:t>
             </a:r>
             <a:r>
-              <a:rPr lang="en-US" sz="3199" dirty="0"/>
+              <a:rPr lang="en-US" sz="3150" dirty="0"/>
               <a:t>: </a:t>
             </a:r>
             <a:r>
-              <a:rPr lang="en-US" sz="3199" b="1" dirty="0">
+              <a:rPr lang="en-US" sz="3150" b="1" dirty="0">
                 <a:solidFill>
                   <a:schemeClr val="bg1"/>
                 </a:solidFill>
@@ -12679,7 +12900,7 @@
               <a:t>O(n</a:t>
             </a:r>
             <a:r>
-              <a:rPr lang="en-US" sz="3199" b="1" baseline="30000" dirty="0">
+              <a:rPr lang="en-US" sz="3150" b="1" baseline="30000" dirty="0">
                 <a:solidFill>
                   <a:schemeClr val="bg1"/>
                 </a:solidFill>
@@ -12687,7 +12908,7 @@
               <a:t>2</a:t>
             </a:r>
             <a:r>
-              <a:rPr lang="en-US" sz="3199" b="1" dirty="0">
+              <a:rPr lang="en-US" sz="3150" b="1" dirty="0">
                 <a:solidFill>
                   <a:schemeClr val="bg1"/>
                 </a:solidFill>
@@ -12695,11 +12916,11 @@
               <a:t>)</a:t>
             </a:r>
             <a:r>
-              <a:rPr lang="en-US" sz="3199" dirty="0"/>
+              <a:rPr lang="en-US" sz="3150" dirty="0"/>
               <a:t>,</a:t>
             </a:r>
             <a:r>
-              <a:rPr lang="en-US" sz="3199" b="1" dirty="0">
+              <a:rPr lang="en-US" sz="3150" b="1" dirty="0">
                 <a:solidFill>
                   <a:schemeClr val="bg1"/>
                 </a:solidFill>
@@ -12707,22 +12928,22 @@
               <a:t> </a:t>
             </a:r>
             <a:r>
-              <a:rPr lang="bg-BG" sz="3199" dirty="0"/>
-              <a:t>Стабилност</a:t>
-            </a:r>
-            <a:r>
-              <a:rPr lang="en-US" sz="3199" dirty="0"/>
+              <a:rPr lang="bg-BG" sz="3150" dirty="0"/>
+              <a:t>Стабилен</a:t>
+            </a:r>
+            <a:r>
+              <a:rPr lang="en-US" sz="3150" dirty="0"/>
               <a:t>: </a:t>
             </a:r>
             <a:r>
-              <a:rPr lang="bg-BG" sz="3199" b="1" dirty="0">
+              <a:rPr lang="bg-BG" sz="3150" b="1" dirty="0">
                 <a:solidFill>
                   <a:schemeClr val="bg1"/>
                 </a:solidFill>
               </a:rPr>
               <a:t>Зависи</a:t>
             </a:r>
-            <a:endParaRPr lang="en-US" sz="3199" b="1" dirty="0">
+            <a:endParaRPr lang="en-US" sz="3150" b="1" dirty="0">
               <a:solidFill>
                 <a:schemeClr val="bg1"/>
               </a:solidFill>
@@ -12735,22 +12956,22 @@
               </a:buClr>
             </a:pPr>
             <a:r>
-              <a:rPr lang="bg-BG" sz="3199" dirty="0"/>
+              <a:rPr lang="bg-BG" sz="3150" dirty="0"/>
               <a:t>Метод</a:t>
             </a:r>
             <a:r>
-              <a:rPr lang="en-US" sz="3199" dirty="0"/>
+              <a:rPr lang="en-US" sz="3150" dirty="0"/>
               <a:t>: </a:t>
             </a:r>
             <a:r>
-              <a:rPr lang="bg-BG" sz="3199" b="1" dirty="0">
+              <a:rPr lang="bg-BG" sz="3150" b="1" dirty="0">
                 <a:solidFill>
                   <a:schemeClr val="bg1"/>
                 </a:solidFill>
               </a:rPr>
               <a:t>Разделяне на дялове</a:t>
             </a:r>
-            <a:endParaRPr lang="en-US" sz="3199" b="1" dirty="0">
+            <a:endParaRPr lang="en-US" sz="3150" b="1" dirty="0">
               <a:solidFill>
                 <a:schemeClr val="bg1"/>
               </a:solidFill>
@@ -12763,65 +12984,61 @@
               </a:buClr>
             </a:pPr>
             <a:r>
-              <a:rPr lang="bg-BG" dirty="0"/>
+              <a:rPr lang="bg-BG" sz="3150" dirty="0"/>
               <a:t>Можете да видите визуализацията</a:t>
             </a:r>
             <a:r>
-              <a:rPr lang="en-US" sz="3199" dirty="0"/>
+              <a:rPr lang="en-US" sz="3150" dirty="0"/>
               <a:t>: </a:t>
             </a:r>
             <a:r>
-              <a:rPr lang="en-US" sz="3199" dirty="0">
-                <a:hlinkClick r:id="rId2"/>
+              <a:rPr lang="en-US" sz="3150" dirty="0">
+                <a:hlinkClick r:id="rId3"/>
               </a:rPr>
               <a:t>https://visualgo.net/en/sorting</a:t>
             </a:r>
             <a:r>
-              <a:rPr lang="en-US" sz="3199" dirty="0"/>
+              <a:rPr lang="en-US" sz="3150" dirty="0"/>
               <a:t> </a:t>
             </a:r>
             <a:r>
-              <a:rPr lang="en-US" sz="3199" dirty="0">
+              <a:rPr lang="en-US" sz="3150" dirty="0">
                 <a:sym typeface="Wingdings" panose="05000000000000000000" pitchFamily="2" charset="2"/>
               </a:rPr>
               <a:t></a:t>
             </a:r>
             <a:r>
-              <a:rPr lang="en-US" sz="3199" dirty="0"/>
+              <a:rPr lang="en-US" sz="3150" dirty="0"/>
               <a:t> </a:t>
             </a:r>
             <a:r>
-              <a:rPr lang="bg-BG" sz="3199" dirty="0"/>
+              <a:rPr lang="bg-BG" sz="3150" dirty="0"/>
               <a:t>изберете</a:t>
             </a:r>
             <a:r>
-              <a:rPr lang="en-US" sz="3199" dirty="0"/>
+              <a:rPr lang="en-US" sz="3150" dirty="0"/>
               <a:t> </a:t>
             </a:r>
             <a:r>
-              <a:rPr lang="en-US" sz="3199" b="1" dirty="0"/>
+              <a:rPr lang="en-US" sz="3150" b="1" dirty="0">
+                <a:solidFill>
+                  <a:schemeClr val="bg1"/>
+                </a:solidFill>
+              </a:rPr>
               <a:t>Quick sort</a:t>
             </a:r>
             <a:r>
-              <a:rPr lang="en-US" sz="3199" dirty="0"/>
+              <a:rPr lang="en-US" sz="3150" dirty="0"/>
               <a:t>: </a:t>
             </a:r>
-            <a:endParaRPr lang="bg-BG" sz="3199" dirty="0"/>
-          </a:p>
-          <a:p>
-            <a:pPr lvl="1">
-              <a:buClr>
-                <a:schemeClr val="tx1"/>
-              </a:buClr>
-            </a:pPr>
-            <a:endParaRPr lang="en-US" sz="3399" b="1" dirty="0">
+            <a:endParaRPr lang="en-US" sz="3150" b="1" dirty="0">
               <a:solidFill>
                 <a:schemeClr val="bg1"/>
               </a:solidFill>
             </a:endParaRPr>
           </a:p>
           <a:p>
-            <a:endParaRPr lang="en-US" dirty="0"/>
+            <a:endParaRPr lang="en-US" sz="3150" dirty="0"/>
           </a:p>
         </p:txBody>
       </p:sp>
@@ -12862,14 +13079,14 @@
           <p:nvPr/>
         </p:nvPicPr>
         <p:blipFill>
-          <a:blip r:embed="rId3"/>
+          <a:blip r:embed="rId4"/>
           <a:stretch>
             <a:fillRect/>
           </a:stretch>
         </p:blipFill>
         <p:spPr>
           <a:xfrm>
-            <a:off x="2766000" y="6394570"/>
+            <a:off x="2766000" y="6195205"/>
             <a:ext cx="7464857" cy="521859"/>
           </a:xfrm>
           <a:prstGeom prst="rect">
@@ -13325,7 +13542,7 @@
             </a:r>
             <a:r>
               <a:rPr lang="bg-BG" dirty="0"/>
-              <a:t>Концептуален преглед</a:t>
+              <a:t>концептуален преглед</a:t>
             </a:r>
             <a:endParaRPr lang="en-US" dirty="0"/>
           </a:p>
@@ -13654,7 +13871,11 @@
               <a:t> </a:t>
             </a:r>
             <a:r>
-              <a:rPr lang="bg-BG" dirty="0"/>
+              <a:rPr lang="bg-BG" b="1" dirty="0">
+                <a:solidFill>
+                  <a:schemeClr val="bg1"/>
+                </a:solidFill>
+              </a:rPr>
               <a:t>подсписък</a:t>
             </a:r>
             <a:r>
@@ -13677,9 +13898,21 @@
             </a:pPr>
             <a:r>
               <a:rPr lang="bg-BG" dirty="0"/>
-              <a:t>Обединява сортираните подсписъци в един списък</a:t>
-            </a:r>
-            <a:endParaRPr lang="en-US" dirty="0"/>
+              <a:t>Обединява сортираните подсписъци в </a:t>
+            </a:r>
+            <a:r>
+              <a:rPr lang="bg-BG" b="1" dirty="0">
+                <a:solidFill>
+                  <a:schemeClr val="bg1"/>
+                </a:solidFill>
+              </a:rPr>
+              <a:t>един списък</a:t>
+            </a:r>
+            <a:endParaRPr lang="en-US" b="1" dirty="0">
+              <a:solidFill>
+                <a:schemeClr val="bg1"/>
+              </a:solidFill>
+            </a:endParaRPr>
           </a:p>
           <a:p>
             <a:r>
@@ -13825,7 +14058,11 @@
               <a:t> </a:t>
             </a:r>
             <a:r>
-              <a:rPr lang="en-US" sz="3499" b="1" dirty="0"/>
+              <a:rPr lang="en-US" sz="3499" b="1" dirty="0">
+                <a:solidFill>
+                  <a:schemeClr val="bg1"/>
+                </a:solidFill>
+              </a:rPr>
               <a:t>Merge sort</a:t>
             </a:r>
             <a:r>
@@ -13887,7 +14124,7 @@
         </p:blipFill>
         <p:spPr>
           <a:xfrm>
-            <a:off x="2423592" y="6103495"/>
+            <a:off x="2361000" y="6296909"/>
             <a:ext cx="6712632" cy="420181"/>
           </a:xfrm>
           <a:prstGeom prst="rect">
@@ -14442,7 +14679,7 @@
             </a:r>
             <a:r>
               <a:rPr lang="bg-BG" dirty="0"/>
-              <a:t>Концептуален преглед</a:t>
+              <a:t>концептуален преглед</a:t>
             </a:r>
             <a:endParaRPr lang="en-US" dirty="0"/>
           </a:p>
@@ -14856,7 +15093,7 @@
             <a:pPr lvl="1"/>
             <a:r>
               <a:rPr lang="bg-BG" dirty="0"/>
-              <a:t>Интерполационното </a:t>
+              <a:t>Интерполационно</a:t>
             </a:r>
             <a:r>
               <a:rPr lang="en-US" dirty="0"/>
@@ -14869,7 +15106,7 @@
             <a:endParaRPr lang="en-US" dirty="0"/>
           </a:p>
           <a:p>
-            <a:pPr marL="667829" indent="-514196">
+            <a:pPr>
               <a:buClr>
                 <a:schemeClr val="tx1"/>
               </a:buClr>
@@ -14884,13 +15121,14 @@
             </a:r>
           </a:p>
           <a:p>
-            <a:pPr>
+            <a:pPr marL="0" indent="0">
               <a:spcBef>
                 <a:spcPts val="1200"/>
               </a:spcBef>
               <a:buClr>
                 <a:schemeClr val="tx1"/>
               </a:buClr>
+              <a:buNone/>
             </a:pPr>
             <a:endParaRPr lang="en-US" dirty="0"/>
           </a:p>
@@ -15602,15 +15840,17 @@
             <a:endParaRPr lang="en-US" dirty="0"/>
           </a:p>
           <a:p>
-            <a:endParaRPr lang="en-US" dirty="0"/>
-          </a:p>
-          <a:p>
             <a:pPr marL="0" indent="0">
               <a:buNone/>
             </a:pPr>
             <a:endParaRPr lang="en-US" dirty="0"/>
           </a:p>
           <a:p>
+            <a:pPr>
+              <a:spcBef>
+                <a:spcPts val="3500"/>
+              </a:spcBef>
+            </a:pPr>
             <a:r>
               <a:rPr lang="bg-BG" sz="3199" dirty="0"/>
               <a:t>Допълнително сравнение на алгоритмите</a:t>
@@ -15661,14 +15901,14 @@
           <p:nvPr>
             <p:extLst>
               <p:ext uri="{D42A27DB-BD31-4B8C-83A1-F6EECF244321}">
-                <p14:modId xmlns:p14="http://schemas.microsoft.com/office/powerpoint/2010/main" val="687212834"/>
+                <p14:modId xmlns:p14="http://schemas.microsoft.com/office/powerpoint/2010/main" val="2938999467"/>
               </p:ext>
             </p:extLst>
           </p:nvPr>
         </p:nvGraphicFramePr>
         <p:xfrm>
-          <a:off x="0" y="1472198"/>
-          <a:ext cx="12176899" cy="3291141"/>
+          <a:off x="191940" y="1472198"/>
+          <a:ext cx="11815019" cy="3108150"/>
         </p:xfrm>
         <a:graphic>
           <a:graphicData uri="http://schemas.openxmlformats.org/drawingml/2006/table">
@@ -15677,49 +15917,49 @@
                 <a:tableStyleId>{5C22544A-7EE6-4342-B048-85BDC9FD1C3A}</a:tableStyleId>
               </a:tblPr>
               <a:tblGrid>
-                <a:gridCol w="1261419">
+                <a:gridCol w="1223932">
                   <a:extLst>
                     <a:ext uri="{9D8B030D-6E8A-4147-A177-3AD203B41FA5}">
                       <a16:colId xmlns:a16="http://schemas.microsoft.com/office/drawing/2014/main" val="2101247631"/>
                     </a:ext>
                   </a:extLst>
                 </a:gridCol>
-                <a:gridCol w="1650716">
+                <a:gridCol w="1601659">
                   <a:extLst>
                     <a:ext uri="{9D8B030D-6E8A-4147-A177-3AD203B41FA5}">
                       <a16:colId xmlns:a16="http://schemas.microsoft.com/office/drawing/2014/main" val="438510769"/>
                     </a:ext>
                   </a:extLst>
                 </a:gridCol>
-                <a:gridCol w="2302314">
+                <a:gridCol w="2233893">
                   <a:extLst>
                     <a:ext uri="{9D8B030D-6E8A-4147-A177-3AD203B41FA5}">
                       <a16:colId xmlns:a16="http://schemas.microsoft.com/office/drawing/2014/main" val="528859185"/>
                     </a:ext>
                   </a:extLst>
                 </a:gridCol>
-                <a:gridCol w="1172877">
+                <a:gridCol w="1138020">
                   <a:extLst>
                     <a:ext uri="{9D8B030D-6E8A-4147-A177-3AD203B41FA5}">
                       <a16:colId xmlns:a16="http://schemas.microsoft.com/office/drawing/2014/main" val="2179662835"/>
                     </a:ext>
                   </a:extLst>
                 </a:gridCol>
-                <a:gridCol w="1954795">
+                <a:gridCol w="1896701">
                   <a:extLst>
                     <a:ext uri="{9D8B030D-6E8A-4147-A177-3AD203B41FA5}">
                       <a16:colId xmlns:a16="http://schemas.microsoft.com/office/drawing/2014/main" val="3412783437"/>
                     </a:ext>
                   </a:extLst>
                 </a:gridCol>
-                <a:gridCol w="1433517">
+                <a:gridCol w="1390915">
                   <a:extLst>
                     <a:ext uri="{9D8B030D-6E8A-4147-A177-3AD203B41FA5}">
                       <a16:colId xmlns:a16="http://schemas.microsoft.com/office/drawing/2014/main" val="2003186109"/>
                     </a:ext>
                   </a:extLst>
                 </a:gridCol>
-                <a:gridCol w="2401261">
+                <a:gridCol w="2329899">
                   <a:extLst>
                     <a:ext uri="{9D8B030D-6E8A-4147-A177-3AD203B41FA5}">
                       <a16:colId xmlns:a16="http://schemas.microsoft.com/office/drawing/2014/main" val="2488302633"/>
@@ -15735,10 +15975,10 @@
                     <a:p>
                       <a:pPr marL="0" algn="ctr" defTabSz="1218438" rtl="0" eaLnBrk="1" latinLnBrk="1" hangingPunct="1"/>
                       <a:r>
-                        <a:rPr lang="bg-BG" sz="2000" dirty="0"/>
+                        <a:rPr lang="bg-BG" sz="1800" b="1" dirty="0"/>
                         <a:t>Име</a:t>
                       </a:r>
-                      <a:endParaRPr lang="en-US" sz="2000" kern="1200" dirty="0">
+                      <a:endParaRPr lang="en-US" sz="1800" b="1" kern="1200" dirty="0">
                         <a:solidFill>
                           <a:schemeClr val="dk1"/>
                         </a:solidFill>
@@ -15757,10 +15997,10 @@
                     <a:p>
                       <a:pPr marL="0" algn="ctr" defTabSz="1218438" rtl="0" eaLnBrk="1" latinLnBrk="1" hangingPunct="1"/>
                       <a:r>
-                        <a:rPr lang="bg-BG" sz="2000" dirty="0"/>
+                        <a:rPr lang="bg-BG" sz="1800" b="1" dirty="0"/>
                         <a:t>Най-добър</a:t>
                       </a:r>
-                      <a:endParaRPr lang="en-US" sz="2000" kern="1200" dirty="0">
+                      <a:endParaRPr lang="en-US" sz="1800" b="1" kern="1200" dirty="0">
                         <a:solidFill>
                           <a:schemeClr val="dk1"/>
                         </a:solidFill>
@@ -15779,10 +16019,10 @@
                     <a:p>
                       <a:pPr marL="0" algn="ctr" defTabSz="1218438" rtl="0" eaLnBrk="1" latinLnBrk="1" hangingPunct="1"/>
                       <a:r>
-                        <a:rPr lang="bg-BG" sz="2000" dirty="0"/>
+                        <a:rPr lang="bg-BG" sz="1800" b="1" dirty="0"/>
                         <a:t>Средноаритметичен</a:t>
                       </a:r>
-                      <a:endParaRPr lang="en-US" sz="2000" kern="1200" dirty="0">
+                      <a:endParaRPr lang="en-US" sz="1800" b="1" kern="1200" dirty="0">
                         <a:solidFill>
                           <a:schemeClr val="dk1"/>
                         </a:solidFill>
@@ -15801,10 +16041,10 @@
                     <a:p>
                       <a:pPr marL="0" algn="ctr" defTabSz="1218438" rtl="0" eaLnBrk="1" latinLnBrk="1" hangingPunct="1"/>
                       <a:r>
-                        <a:rPr lang="bg-BG" sz="2000" dirty="0"/>
+                        <a:rPr lang="bg-BG" sz="1800" b="1" dirty="0"/>
                         <a:t>Най-лош</a:t>
                       </a:r>
-                      <a:endParaRPr lang="en-US" sz="2000" kern="1200" dirty="0">
+                      <a:endParaRPr lang="en-US" sz="1800" b="1" kern="1200" dirty="0">
                         <a:solidFill>
                           <a:schemeClr val="dk1"/>
                         </a:solidFill>
@@ -15823,10 +16063,10 @@
                     <a:p>
                       <a:pPr marL="0" algn="ctr" defTabSz="1218438" rtl="0" eaLnBrk="1" latinLnBrk="1" hangingPunct="1"/>
                       <a:r>
-                        <a:rPr lang="bg-BG" sz="2000" dirty="0"/>
+                        <a:rPr lang="bg-BG" sz="1800" b="1" dirty="0"/>
                         <a:t>Памет</a:t>
                       </a:r>
-                      <a:endParaRPr lang="en-US" sz="2000" kern="1200" dirty="0">
+                      <a:endParaRPr lang="en-US" sz="1800" b="1" kern="1200" dirty="0">
                         <a:solidFill>
                           <a:schemeClr val="dk1"/>
                         </a:solidFill>
@@ -15845,10 +16085,10 @@
                     <a:p>
                       <a:pPr marL="0" algn="ctr" defTabSz="1218438" rtl="0" eaLnBrk="1" latinLnBrk="1" hangingPunct="1"/>
                       <a:r>
-                        <a:rPr lang="bg-BG" sz="2000" dirty="0"/>
+                        <a:rPr lang="bg-BG" sz="1800" b="1" dirty="0"/>
                         <a:t>Стабилност</a:t>
                       </a:r>
-                      <a:endParaRPr lang="en-US" sz="2000" kern="1200" dirty="0">
+                      <a:endParaRPr lang="en-US" sz="1800" b="1" kern="1200" dirty="0">
                         <a:solidFill>
                           <a:schemeClr val="dk1"/>
                         </a:solidFill>
@@ -15867,10 +16107,10 @@
                     <a:p>
                       <a:pPr marL="0" algn="ctr" defTabSz="1218438" rtl="0" eaLnBrk="1" latinLnBrk="1" hangingPunct="1"/>
                       <a:r>
-                        <a:rPr lang="bg-BG" sz="2000" dirty="0"/>
+                        <a:rPr lang="bg-BG" sz="1800" b="1" dirty="0"/>
                         <a:t>Метод</a:t>
                       </a:r>
-                      <a:endParaRPr lang="en-US" sz="2000" kern="1200" dirty="0">
+                      <a:endParaRPr lang="en-US" sz="1800" b="1" kern="1200" dirty="0">
                         <a:solidFill>
                           <a:schemeClr val="dk1"/>
                         </a:solidFill>
@@ -15896,7 +16136,7 @@
                     <a:p>
                       <a:pPr marL="0" algn="ctr" defTabSz="1218438" rtl="0" eaLnBrk="1" latinLnBrk="1" hangingPunct="1"/>
                       <a:r>
-                        <a:rPr lang="en-US" sz="2000" b="1" kern="1200" dirty="0">
+                        <a:rPr lang="en-US" sz="1800" b="1" kern="1200" dirty="0">
                           <a:solidFill>
                             <a:schemeClr val="dk1"/>
                           </a:solidFill>
@@ -15917,7 +16157,7 @@
                     <a:p>
                       <a:pPr marL="0" algn="ctr" defTabSz="1218438" rtl="0" eaLnBrk="1" latinLnBrk="1" hangingPunct="1"/>
                       <a:r>
-                        <a:rPr lang="en-US" sz="2000" kern="1200" dirty="0">
+                        <a:rPr lang="en-US" sz="1800" kern="1200" dirty="0">
                           <a:solidFill>
                             <a:schemeClr val="dk1"/>
                           </a:solidFill>
@@ -15928,7 +16168,7 @@
                         <a:t>n</a:t>
                       </a:r>
                       <a:r>
-                        <a:rPr lang="en-US" sz="2000" kern="1200" baseline="30000" dirty="0">
+                        <a:rPr lang="en-US" sz="1800" kern="1200" baseline="30000" dirty="0">
                           <a:solidFill>
                             <a:schemeClr val="dk1"/>
                           </a:solidFill>
@@ -15949,7 +16189,7 @@
                     <a:p>
                       <a:pPr marL="0" algn="ctr" defTabSz="1218438" rtl="0" eaLnBrk="1" latinLnBrk="1" hangingPunct="1"/>
                       <a:r>
-                        <a:rPr lang="en-US" sz="2000" kern="1200" dirty="0">
+                        <a:rPr lang="en-US" sz="1800" kern="1200" dirty="0">
                           <a:solidFill>
                             <a:schemeClr val="dk1"/>
                           </a:solidFill>
@@ -15960,7 +16200,7 @@
                         <a:t>n</a:t>
                       </a:r>
                       <a:r>
-                        <a:rPr lang="en-US" sz="2000" kern="1200" baseline="30000" dirty="0">
+                        <a:rPr lang="en-US" sz="1800" kern="1200" baseline="30000" dirty="0">
                           <a:solidFill>
                             <a:schemeClr val="dk1"/>
                           </a:solidFill>
@@ -15981,7 +16221,7 @@
                     <a:p>
                       <a:pPr marL="0" algn="ctr" defTabSz="1218438" rtl="0" eaLnBrk="1" latinLnBrk="1" hangingPunct="1"/>
                       <a:r>
-                        <a:rPr lang="en-US" sz="2000" kern="1200" dirty="0">
+                        <a:rPr lang="en-US" sz="1800" kern="1200" dirty="0">
                           <a:solidFill>
                             <a:schemeClr val="dk1"/>
                           </a:solidFill>
@@ -15992,7 +16232,7 @@
                         <a:t>n</a:t>
                       </a:r>
                       <a:r>
-                        <a:rPr lang="en-US" sz="2000" kern="1200" baseline="30000" dirty="0">
+                        <a:rPr lang="en-US" sz="1800" kern="1200" baseline="30000" dirty="0">
                           <a:solidFill>
                             <a:schemeClr val="dk1"/>
                           </a:solidFill>
@@ -16013,7 +16253,7 @@
                     <a:p>
                       <a:pPr marL="0" algn="ctr" defTabSz="1218438" rtl="0" eaLnBrk="1" latinLnBrk="1" hangingPunct="1"/>
                       <a:r>
-                        <a:rPr lang="en-US" sz="2000" kern="1200" dirty="0">
+                        <a:rPr lang="en-US" sz="1800" kern="1200" dirty="0">
                           <a:solidFill>
                             <a:schemeClr val="dk1"/>
                           </a:solidFill>
@@ -16034,7 +16274,7 @@
                     <a:p>
                       <a:pPr marL="0" algn="ctr" defTabSz="1218438" rtl="0" eaLnBrk="1" latinLnBrk="1" hangingPunct="1"/>
                       <a:r>
-                        <a:rPr lang="bg-BG" sz="2000" kern="1200" dirty="0">
+                        <a:rPr lang="bg-BG" sz="1800" kern="1200" dirty="0">
                           <a:solidFill>
                             <a:schemeClr val="dk1"/>
                           </a:solidFill>
@@ -16044,7 +16284,7 @@
                         </a:rPr>
                         <a:t>Не</a:t>
                       </a:r>
-                      <a:endParaRPr lang="en-US" sz="2000" kern="1200" dirty="0">
+                      <a:endParaRPr lang="en-US" sz="1800" kern="1200" dirty="0">
                         <a:solidFill>
                           <a:schemeClr val="dk1"/>
                         </a:solidFill>
@@ -16063,10 +16303,10 @@
                     <a:p>
                       <a:pPr marL="0" algn="ctr" defTabSz="1218438" rtl="0" eaLnBrk="1" latinLnBrk="1" hangingPunct="1"/>
                       <a:r>
-                        <a:rPr lang="bg-BG" sz="2000" dirty="0"/>
+                        <a:rPr lang="bg-BG" sz="1800" dirty="0"/>
                         <a:t>Избиране</a:t>
                       </a:r>
-                      <a:endParaRPr lang="en-US" sz="2000" kern="1200" dirty="0">
+                      <a:endParaRPr lang="en-US" sz="1800" kern="1200" dirty="0">
                         <a:solidFill>
                           <a:schemeClr val="dk1"/>
                         </a:solidFill>
@@ -16092,7 +16332,7 @@
                     <a:p>
                       <a:pPr marL="0" algn="ctr" defTabSz="1218438" rtl="0" eaLnBrk="1" latinLnBrk="1" hangingPunct="1"/>
                       <a:r>
-                        <a:rPr lang="en-US" sz="2000" b="1" kern="1200" dirty="0">
+                        <a:rPr lang="en-US" sz="1800" b="1" kern="1200" dirty="0">
                           <a:solidFill>
                             <a:schemeClr val="dk1"/>
                           </a:solidFill>
@@ -16113,7 +16353,7 @@
                     <a:p>
                       <a:pPr marL="0" algn="ctr" defTabSz="1218438" rtl="0" eaLnBrk="1" latinLnBrk="1" hangingPunct="1"/>
                       <a:r>
-                        <a:rPr lang="en-US" sz="2000" kern="1200" dirty="0">
+                        <a:rPr lang="en-US" sz="1800" kern="1200" dirty="0">
                           <a:solidFill>
                             <a:schemeClr val="dk1"/>
                           </a:solidFill>
@@ -16150,7 +16390,7 @@
                         <a:defRPr/>
                       </a:pPr>
                       <a:r>
-                        <a:rPr lang="en-US" sz="2000" kern="1200" dirty="0">
+                        <a:rPr lang="en-US" sz="1800" kern="1200" dirty="0">
                           <a:solidFill>
                             <a:schemeClr val="dk1"/>
                           </a:solidFill>
@@ -16161,7 +16401,7 @@
                         <a:t>n</a:t>
                       </a:r>
                       <a:r>
-                        <a:rPr lang="en-US" sz="2000" kern="1200" baseline="30000" dirty="0">
+                        <a:rPr lang="en-US" sz="1800" kern="1200" baseline="30000" dirty="0">
                           <a:solidFill>
                             <a:schemeClr val="dk1"/>
                           </a:solidFill>
@@ -16198,7 +16438,7 @@
                         <a:defRPr/>
                       </a:pPr>
                       <a:r>
-                        <a:rPr lang="en-US" sz="2000" kern="1200" dirty="0">
+                        <a:rPr lang="en-US" sz="1800" kern="1200" dirty="0">
                           <a:solidFill>
                             <a:schemeClr val="dk1"/>
                           </a:solidFill>
@@ -16209,7 +16449,7 @@
                         <a:t>n</a:t>
                       </a:r>
                       <a:r>
-                        <a:rPr lang="en-US" sz="2000" kern="1200" baseline="30000" dirty="0">
+                        <a:rPr lang="en-US" sz="1800" kern="1200" baseline="30000" dirty="0">
                           <a:solidFill>
                             <a:schemeClr val="dk1"/>
                           </a:solidFill>
@@ -16230,7 +16470,7 @@
                     <a:p>
                       <a:pPr marL="0" algn="ctr" defTabSz="1218438" rtl="0" eaLnBrk="1" latinLnBrk="1" hangingPunct="1"/>
                       <a:r>
-                        <a:rPr lang="en-US" sz="2000" kern="1200" dirty="0">
+                        <a:rPr lang="en-US" sz="1800" kern="1200" dirty="0">
                           <a:solidFill>
                             <a:schemeClr val="dk1"/>
                           </a:solidFill>
@@ -16251,7 +16491,7 @@
                     <a:p>
                       <a:pPr marL="0" algn="ctr" defTabSz="1218438" rtl="0" eaLnBrk="1" latinLnBrk="1" hangingPunct="1"/>
                       <a:r>
-                        <a:rPr lang="bg-BG" sz="2000" kern="1200" dirty="0">
+                        <a:rPr lang="bg-BG" sz="1800" kern="1200" dirty="0">
                           <a:solidFill>
                             <a:schemeClr val="dk1"/>
                           </a:solidFill>
@@ -16261,7 +16501,7 @@
                         </a:rPr>
                         <a:t>Да</a:t>
                       </a:r>
-                      <a:endParaRPr lang="en-US" sz="2000" kern="1200" dirty="0">
+                      <a:endParaRPr lang="en-US" sz="1800" kern="1200" dirty="0">
                         <a:solidFill>
                           <a:schemeClr val="dk1"/>
                         </a:solidFill>
@@ -16280,10 +16520,10 @@
                     <a:p>
                       <a:pPr marL="0" algn="ctr" defTabSz="1218438" rtl="0" eaLnBrk="1" latinLnBrk="1" hangingPunct="1"/>
                       <a:r>
-                        <a:rPr lang="bg-BG" sz="2000" dirty="0"/>
+                        <a:rPr lang="bg-BG" sz="1800" dirty="0"/>
                         <a:t>Размяна</a:t>
                       </a:r>
-                      <a:endParaRPr lang="en-US" sz="2000" kern="1200" dirty="0">
+                      <a:endParaRPr lang="en-US" sz="1800" kern="1200" dirty="0">
                         <a:solidFill>
                           <a:schemeClr val="dk1"/>
                         </a:solidFill>
@@ -16309,7 +16549,7 @@
                     <a:p>
                       <a:pPr marL="0" algn="ctr" defTabSz="1218438" rtl="0" eaLnBrk="1" latinLnBrk="1" hangingPunct="1"/>
                       <a:r>
-                        <a:rPr lang="en-US" sz="2000" b="1" kern="1200" dirty="0">
+                        <a:rPr lang="en-US" sz="1800" b="1" kern="1200" dirty="0">
                           <a:solidFill>
                             <a:schemeClr val="dk1"/>
                           </a:solidFill>
@@ -16330,7 +16570,7 @@
                     <a:p>
                       <a:pPr marL="0" algn="ctr" defTabSz="1218438" rtl="0" eaLnBrk="1" latinLnBrk="1" hangingPunct="1"/>
                       <a:r>
-                        <a:rPr lang="en-US" sz="2000" kern="1200" dirty="0">
+                        <a:rPr lang="en-US" sz="1800" kern="1200" dirty="0">
                           <a:solidFill>
                             <a:schemeClr val="dk1"/>
                           </a:solidFill>
@@ -16367,7 +16607,7 @@
                         <a:defRPr/>
                       </a:pPr>
                       <a:r>
-                        <a:rPr lang="en-US" sz="2000" kern="1200" dirty="0">
+                        <a:rPr lang="en-US" sz="1800" kern="1200" dirty="0">
                           <a:solidFill>
                             <a:schemeClr val="dk1"/>
                           </a:solidFill>
@@ -16378,7 +16618,7 @@
                         <a:t>n</a:t>
                       </a:r>
                       <a:r>
-                        <a:rPr lang="en-US" sz="2000" kern="1200" baseline="30000" dirty="0">
+                        <a:rPr lang="en-US" sz="1800" kern="1200" baseline="30000" dirty="0">
                           <a:solidFill>
                             <a:schemeClr val="dk1"/>
                           </a:solidFill>
@@ -16415,7 +16655,7 @@
                         <a:defRPr/>
                       </a:pPr>
                       <a:r>
-                        <a:rPr lang="en-US" sz="2000" kern="1200" dirty="0">
+                        <a:rPr lang="en-US" sz="1800" kern="1200" dirty="0">
                           <a:solidFill>
                             <a:schemeClr val="dk1"/>
                           </a:solidFill>
@@ -16426,7 +16666,7 @@
                         <a:t>n</a:t>
                       </a:r>
                       <a:r>
-                        <a:rPr lang="en-US" sz="2000" kern="1200" baseline="30000" dirty="0">
+                        <a:rPr lang="en-US" sz="1800" kern="1200" baseline="30000" dirty="0">
                           <a:solidFill>
                             <a:schemeClr val="dk1"/>
                           </a:solidFill>
@@ -16447,7 +16687,7 @@
                     <a:p>
                       <a:pPr marL="0" algn="ctr" defTabSz="1218438" rtl="0" eaLnBrk="1" latinLnBrk="1" hangingPunct="1"/>
                       <a:r>
-                        <a:rPr lang="en-US" sz="2000" kern="1200" dirty="0">
+                        <a:rPr lang="en-US" sz="1800" kern="1200" dirty="0">
                           <a:solidFill>
                             <a:schemeClr val="dk1"/>
                           </a:solidFill>
@@ -16468,7 +16708,7 @@
                     <a:p>
                       <a:pPr marL="0" algn="ctr" defTabSz="1218438" rtl="0" eaLnBrk="1" latinLnBrk="1" hangingPunct="1"/>
                       <a:r>
-                        <a:rPr lang="bg-BG" sz="2000" kern="1200" dirty="0">
+                        <a:rPr lang="bg-BG" sz="1800" kern="1200" dirty="0">
                           <a:solidFill>
                             <a:schemeClr val="dk1"/>
                           </a:solidFill>
@@ -16478,7 +16718,7 @@
                         </a:rPr>
                         <a:t>Да</a:t>
                       </a:r>
-                      <a:endParaRPr lang="en-US" sz="2000" kern="1200" dirty="0">
+                      <a:endParaRPr lang="en-US" sz="1800" kern="1200" dirty="0">
                         <a:solidFill>
                           <a:schemeClr val="dk1"/>
                         </a:solidFill>
@@ -16497,7 +16737,7 @@
                     <a:p>
                       <a:pPr marL="0" algn="ctr" defTabSz="1218438" rtl="0" eaLnBrk="1" latinLnBrk="1" hangingPunct="1"/>
                       <a:r>
-                        <a:rPr lang="bg-BG" sz="2000" b="0" kern="1200" dirty="0">
+                        <a:rPr lang="bg-BG" sz="1800" b="0" kern="1200" dirty="0">
                           <a:solidFill>
                             <a:schemeClr val="dk1"/>
                           </a:solidFill>
@@ -16507,7 +16747,7 @@
                         </a:rPr>
                         <a:t>Добавяне</a:t>
                       </a:r>
-                      <a:endParaRPr lang="en-US" sz="2000" kern="1200" dirty="0">
+                      <a:endParaRPr lang="en-US" sz="1800" kern="1200" dirty="0">
                         <a:solidFill>
                           <a:schemeClr val="dk1"/>
                         </a:solidFill>
@@ -16533,7 +16773,7 @@
                     <a:p>
                       <a:pPr marL="0" algn="ctr" defTabSz="1218438" rtl="0" eaLnBrk="1" latinLnBrk="1" hangingPunct="1"/>
                       <a:r>
-                        <a:rPr lang="en-US" sz="2000" b="1" kern="1200" dirty="0">
+                        <a:rPr lang="en-US" sz="1800" b="1" kern="1200" dirty="0">
                           <a:solidFill>
                             <a:schemeClr val="dk1"/>
                           </a:solidFill>
@@ -16554,7 +16794,7 @@
                     <a:p>
                       <a:pPr marL="0" algn="ctr" defTabSz="1218438" rtl="0" eaLnBrk="1" latinLnBrk="1" hangingPunct="1"/>
                       <a:r>
-                        <a:rPr lang="en-US" sz="2000" kern="1200" dirty="0">
+                        <a:rPr lang="en-US" sz="1800" kern="1200" dirty="0">
                           <a:solidFill>
                             <a:schemeClr val="dk1"/>
                           </a:solidFill>
@@ -16591,7 +16831,7 @@
                         <a:defRPr/>
                       </a:pPr>
                       <a:r>
-                        <a:rPr lang="en-US" sz="2000" kern="1200" dirty="0">
+                        <a:rPr lang="en-US" sz="1800" kern="1200" dirty="0">
                           <a:solidFill>
                             <a:schemeClr val="dk1"/>
                           </a:solidFill>
@@ -16628,7 +16868,7 @@
                         <a:defRPr/>
                       </a:pPr>
                       <a:r>
-                        <a:rPr lang="en-US" sz="2000" kern="1200" dirty="0">
+                        <a:rPr lang="en-US" sz="1800" kern="1200" dirty="0">
                           <a:solidFill>
                             <a:schemeClr val="dk1"/>
                           </a:solidFill>
@@ -16639,7 +16879,7 @@
                         <a:t>n</a:t>
                       </a:r>
                       <a:r>
-                        <a:rPr lang="en-US" sz="2000" kern="1200" baseline="30000" dirty="0">
+                        <a:rPr lang="en-US" sz="1800" kern="1200" baseline="30000" dirty="0">
                           <a:solidFill>
                             <a:schemeClr val="dk1"/>
                           </a:solidFill>
@@ -16660,7 +16900,7 @@
                     <a:p>
                       <a:pPr marL="0" algn="ctr" defTabSz="1218438" rtl="0" eaLnBrk="1" latinLnBrk="1" hangingPunct="1"/>
                       <a:r>
-                        <a:rPr lang="en-US" sz="2000" kern="1200" dirty="0">
+                        <a:rPr lang="en-US" sz="1800" kern="1200" dirty="0">
                           <a:solidFill>
                             <a:schemeClr val="dk1"/>
                           </a:solidFill>
@@ -16681,7 +16921,7 @@
                     <a:p>
                       <a:pPr marL="0" algn="ctr" defTabSz="1218438" rtl="0" eaLnBrk="1" latinLnBrk="1" hangingPunct="1"/>
                       <a:r>
-                        <a:rPr lang="bg-BG" sz="2000" kern="1200" dirty="0">
+                        <a:rPr lang="bg-BG" sz="1800" kern="1200" dirty="0">
                           <a:solidFill>
                             <a:schemeClr val="dk1"/>
                           </a:solidFill>
@@ -16691,7 +16931,7 @@
                         </a:rPr>
                         <a:t>Зависи</a:t>
                       </a:r>
-                      <a:endParaRPr lang="en-US" sz="2000" kern="1200" dirty="0">
+                      <a:endParaRPr lang="en-US" sz="1800" kern="1200" dirty="0">
                         <a:solidFill>
                           <a:schemeClr val="dk1"/>
                         </a:solidFill>
@@ -16710,7 +16950,7 @@
                     <a:p>
                       <a:pPr marL="0" algn="ctr" defTabSz="1218438" rtl="0" eaLnBrk="1" latinLnBrk="1" hangingPunct="1"/>
                       <a:r>
-                        <a:rPr lang="bg-BG" sz="2000" kern="1200" dirty="0">
+                        <a:rPr lang="bg-BG" sz="1800" kern="1200" dirty="0">
                           <a:solidFill>
                             <a:schemeClr val="dk1"/>
                           </a:solidFill>
@@ -16720,7 +16960,7 @@
                         </a:rPr>
                         <a:t>Преграждане</a:t>
                       </a:r>
-                      <a:endParaRPr lang="en-US" sz="2000" kern="1200" dirty="0">
+                      <a:endParaRPr lang="en-US" sz="1800" kern="1200" dirty="0">
                         <a:solidFill>
                           <a:schemeClr val="dk1"/>
                         </a:solidFill>
@@ -16746,7 +16986,7 @@
                     <a:p>
                       <a:pPr marL="0" algn="ctr" defTabSz="1218438" rtl="0" eaLnBrk="1" latinLnBrk="1" hangingPunct="1"/>
                       <a:r>
-                        <a:rPr lang="en-US" sz="2000" b="1" kern="1200" dirty="0">
+                        <a:rPr lang="en-US" sz="1800" b="1" kern="1200" dirty="0">
                           <a:solidFill>
                             <a:schemeClr val="dk1"/>
                           </a:solidFill>
@@ -16783,7 +17023,7 @@
                         <a:defRPr/>
                       </a:pPr>
                       <a:r>
-                        <a:rPr lang="en-US" sz="2000" kern="1200" dirty="0">
+                        <a:rPr lang="en-US" sz="1800" kern="1200" dirty="0">
                           <a:solidFill>
                             <a:schemeClr val="dk1"/>
                           </a:solidFill>
@@ -16820,7 +17060,7 @@
                         <a:defRPr/>
                       </a:pPr>
                       <a:r>
-                        <a:rPr lang="en-US" sz="2000" kern="1200" dirty="0">
+                        <a:rPr lang="en-US" sz="1800" kern="1200" dirty="0">
                           <a:solidFill>
                             <a:schemeClr val="dk1"/>
                           </a:solidFill>
@@ -16857,7 +17097,7 @@
                         <a:defRPr/>
                       </a:pPr>
                       <a:r>
-                        <a:rPr lang="en-US" sz="2000" kern="1200" dirty="0">
+                        <a:rPr lang="en-US" sz="1800" kern="1200" dirty="0">
                           <a:solidFill>
                             <a:schemeClr val="dk1"/>
                           </a:solidFill>
@@ -16878,7 +17118,7 @@
                     <a:p>
                       <a:pPr marL="0" algn="ctr" defTabSz="1218438" rtl="0" eaLnBrk="1" latinLnBrk="1" hangingPunct="1"/>
                       <a:r>
-                        <a:rPr lang="en-US" sz="2000" kern="1200" dirty="0">
+                        <a:rPr lang="en-US" sz="1800" kern="1200" dirty="0">
                           <a:solidFill>
                             <a:schemeClr val="dk1"/>
                           </a:solidFill>
@@ -16899,7 +17139,7 @@
                     <a:p>
                       <a:pPr marL="0" algn="ctr" defTabSz="1218438" rtl="0" eaLnBrk="1" latinLnBrk="1" hangingPunct="1"/>
                       <a:r>
-                        <a:rPr lang="bg-BG" sz="2000" kern="1200" dirty="0">
+                        <a:rPr lang="bg-BG" sz="1800" kern="1200" dirty="0">
                           <a:solidFill>
                             <a:schemeClr val="dk1"/>
                           </a:solidFill>
@@ -16909,7 +17149,7 @@
                         </a:rPr>
                         <a:t>Да</a:t>
                       </a:r>
-                      <a:endParaRPr lang="en-US" sz="2000" kern="1200" dirty="0">
+                      <a:endParaRPr lang="en-US" sz="1800" kern="1200" dirty="0">
                         <a:solidFill>
                           <a:schemeClr val="dk1"/>
                         </a:solidFill>
@@ -16928,7 +17168,7 @@
                     <a:p>
                       <a:pPr marL="0" algn="ctr" defTabSz="1218438" rtl="0" eaLnBrk="1" latinLnBrk="1" hangingPunct="1"/>
                       <a:r>
-                        <a:rPr lang="bg-BG" sz="2000" kern="1200" dirty="0">
+                        <a:rPr lang="bg-BG" sz="1800" kern="1200" dirty="0">
                           <a:solidFill>
                             <a:schemeClr val="dk1"/>
                           </a:solidFill>
@@ -16938,7 +17178,7 @@
                         </a:rPr>
                         <a:t>Обединяване</a:t>
                       </a:r>
-                      <a:endParaRPr lang="en-US" sz="2000" kern="1200" dirty="0">
+                      <a:endParaRPr lang="en-US" sz="1800" kern="1200" dirty="0">
                         <a:solidFill>
                           <a:schemeClr val="dk1"/>
                         </a:solidFill>
@@ -17101,7 +17341,7 @@
                                         <p:tgtEl>
                                           <p:spTgt spid="6">
                                             <p:txEl>
-                                              <p:pRg st="6" end="6"/>
+                                              <p:pRg st="5" end="5"/>
                                             </p:txEl>
                                           </p:spTgt>
                                         </p:tgtEl>
@@ -17444,7 +17684,7 @@
             </a:pPr>
             <a:r>
               <a:rPr lang="bg-BG" dirty="0"/>
-              <a:t>Примерно</a:t>
+              <a:t>Пример</a:t>
             </a:r>
             <a:r>
               <a:rPr lang="en-US" dirty="0"/>
@@ -17546,8 +17786,8 @@
         </p:blipFill>
         <p:spPr>
           <a:xfrm>
-            <a:off x="8406591" y="2584677"/>
-            <a:ext cx="3346439" cy="2751662"/>
+            <a:off x="8954568" y="2642436"/>
+            <a:ext cx="3047030" cy="2505469"/>
           </a:xfrm>
           <a:prstGeom prst="rect">
             <a:avLst/>
@@ -17555,7 +17795,7 @@
           <a:ln>
             <a:solidFill>
               <a:schemeClr val="bg2">
-                <a:lumMod val="85000"/>
+                <a:lumMod val="75000"/>
               </a:schemeClr>
             </a:solidFill>
           </a:ln>
@@ -18043,6 +18283,76 @@
       </p:grpSpPr>
       <p:sp>
         <p:nvSpPr>
+          <p:cNvPr id="6" name="Subtitle 5">
+            <a:extLst>
+              <a:ext uri="{FF2B5EF4-FFF2-40B4-BE49-F238E27FC236}">
+                <a16:creationId xmlns:a16="http://schemas.microsoft.com/office/drawing/2014/main" id="{E7222F04-8D20-3E7F-960C-4EF3B37631B6}"/>
+              </a:ext>
+            </a:extLst>
+          </p:cNvPr>
+          <p:cNvSpPr>
+            <a:spLocks noGrp="1"/>
+          </p:cNvSpPr>
+          <p:nvPr>
+            <p:ph type="subTitle" sz="quarter" idx="11"/>
+          </p:nvPr>
+        </p:nvSpPr>
+        <p:spPr/>
+        <p:txBody>
+          <a:bodyPr/>
+          <a:lstStyle/>
+          <a:p>
+            <a:r>
+              <a:rPr lang="bg-BG" dirty="0"/>
+              <a:t>Линейно</a:t>
+            </a:r>
+            <a:r>
+              <a:rPr lang="en-GB" dirty="0"/>
+              <a:t>, </a:t>
+            </a:r>
+            <a:r>
+              <a:rPr lang="bg-BG" dirty="0"/>
+              <a:t>двоично</a:t>
+            </a:r>
+            <a:r>
+              <a:rPr lang="en-GB" dirty="0"/>
+              <a:t> </a:t>
+            </a:r>
+            <a:r>
+              <a:rPr lang="bg-BG" dirty="0"/>
+              <a:t>и</a:t>
+            </a:r>
+            <a:r>
+              <a:rPr lang="en-GB" dirty="0"/>
+              <a:t> </a:t>
+            </a:r>
+            <a:r>
+              <a:rPr lang="bg-BG" dirty="0">
+                <a:latin typeface="Google Sans"/>
+              </a:rPr>
+              <a:t>и</a:t>
+            </a:r>
+            <a:r>
+              <a:rPr lang="bg-BG" i="0" dirty="0">
+                <a:effectLst/>
+                <a:latin typeface="Google Sans"/>
+              </a:rPr>
+              <a:t>нтерполационно </a:t>
+            </a:r>
+            <a:r>
+              <a:rPr lang="en-GB" dirty="0"/>
+              <a:t> </a:t>
+            </a:r>
+            <a:r>
+              <a:rPr lang="bg-BG" dirty="0"/>
+              <a:t>търсене</a:t>
+            </a:r>
+            <a:endParaRPr lang="en-BG" dirty="0"/>
+          </a:p>
+        </p:txBody>
+      </p:sp>
+      <p:sp>
+        <p:nvSpPr>
           <p:cNvPr id="2" name="Title 1"/>
           <p:cNvSpPr>
             <a:spLocks noGrp="1"/>
@@ -18058,48 +18368,7 @@
           <a:p>
             <a:r>
               <a:rPr lang="bg-BG" dirty="0"/>
-              <a:t>Линейно</a:t>
-            </a:r>
-            <a:r>
-              <a:rPr lang="en-GB" dirty="0"/>
-              <a:t>, </a:t>
-            </a:r>
-            <a:r>
-              <a:rPr lang="bg-BG" dirty="0"/>
-              <a:t>двоично</a:t>
-            </a:r>
-            <a:r>
-              <a:rPr lang="en-GB" dirty="0"/>
-              <a:t> </a:t>
-            </a:r>
-            <a:r>
-              <a:rPr lang="bg-BG" dirty="0"/>
-              <a:t>и</a:t>
-            </a:r>
-            <a:r>
-              <a:rPr lang="en-GB" dirty="0"/>
-              <a:t> </a:t>
-            </a:r>
-            <a:r>
-              <a:rPr lang="bg-BG" dirty="0">
-                <a:latin typeface="Google Sans"/>
-              </a:rPr>
-              <a:t>и</a:t>
-            </a:r>
-            <a:r>
-              <a:rPr lang="bg-BG" i="0" dirty="0">
-                <a:effectLst/>
-                <a:latin typeface="Google Sans"/>
-              </a:rPr>
-              <a:t>нтерполационно </a:t>
-            </a:r>
-            <a:r>
-              <a:rPr lang="en-GB" dirty="0"/>
-              <a:t> </a:t>
-            </a:r>
-            <a:r>
-              <a:rPr lang="bg-BG" dirty="0"/>
-              <a:t>търсене</a:t>
+              <a:t>Алгоритми за търсене</a:t>
             </a:r>
             <a:endParaRPr lang="en-US" dirty="0"/>
           </a:p>
@@ -18107,10 +18376,10 @@
       </p:sp>
       <p:grpSp>
         <p:nvGrpSpPr>
-          <p:cNvPr id="4" name="Групиране 3">
+          <p:cNvPr id="3" name="Group 2">
             <a:extLst>
               <a:ext uri="{FF2B5EF4-FFF2-40B4-BE49-F238E27FC236}">
-                <a16:creationId xmlns:a16="http://schemas.microsoft.com/office/drawing/2014/main" id="{5C3C42E2-60C5-4C88-B550-3EE0C9729CBA}"/>
+                <a16:creationId xmlns:a16="http://schemas.microsoft.com/office/drawing/2014/main" id="{A83A2C9E-4065-2B06-DFCB-1B352A9E97F5}"/>
               </a:ext>
             </a:extLst>
           </p:cNvPr>
@@ -18119,10 +18388,10 @@
         </p:nvGrpSpPr>
         <p:grpSpPr>
           <a:xfrm>
-            <a:off x="4888823" y="1494504"/>
-            <a:ext cx="2414354" cy="2414354"/>
-            <a:chOff x="4888508" y="1494000"/>
-            <a:chExt cx="2414983" cy="2414983"/>
+            <a:off x="4727411" y="1385091"/>
+            <a:ext cx="2737177" cy="2737177"/>
+            <a:chOff x="4791000" y="1385091"/>
+            <a:chExt cx="2737177" cy="2737177"/>
           </a:xfrm>
         </p:grpSpPr>
         <p:pic>
@@ -18141,7 +18410,6 @@
           </p:nvPicPr>
           <p:blipFill>
             <a:blip r:embed="rId2">
-              <a:lum contrast="100000"/>
               <a:extLst>
                 <a:ext uri="{28A0092B-C50C-407E-A947-70E740481C1C}">
                   <a14:useLocalDpi xmlns:a14="http://schemas.microsoft.com/office/drawing/2010/main" val="0"/>
@@ -18157,8 +18425,8 @@
           </p:blipFill>
           <p:spPr>
             <a:xfrm>
-              <a:off x="4888508" y="1494000"/>
-              <a:ext cx="2414983" cy="2414983"/>
+              <a:off x="4791000" y="1385091"/>
+              <a:ext cx="2737177" cy="2737177"/>
             </a:xfrm>
             <a:prstGeom prst="rect">
               <a:avLst/>
@@ -18181,7 +18449,6 @@
           </p:nvPicPr>
           <p:blipFill>
             <a:blip r:embed="rId4" cstate="print">
-              <a:lum bright="100000"/>
               <a:extLst>
                 <a:ext uri="{28A0092B-C50C-407E-A947-70E740481C1C}">
                   <a14:useLocalDpi xmlns:a14="http://schemas.microsoft.com/office/drawing/2010/main" val="0"/>
@@ -18197,8 +18464,8 @@
           </p:blipFill>
           <p:spPr>
             <a:xfrm>
-              <a:off x="5241000" y="1854000"/>
-              <a:ext cx="1247741" cy="1247741"/>
+              <a:off x="5286000" y="1854000"/>
+              <a:ext cx="1247416" cy="1247416"/>
             </a:xfrm>
             <a:prstGeom prst="rect">
               <a:avLst/>
@@ -18382,7 +18649,7 @@
                   <a:schemeClr val="bg1"/>
                 </a:solidFill>
               </a:rPr>
-              <a:t>минималния</a:t>
+              <a:t>минимална</a:t>
             </a:r>
             <a:r>
               <a:rPr lang="en-US" b="1" dirty="0">
@@ -18398,7 +18665,7 @@
                   <a:schemeClr val="bg1"/>
                 </a:solidFill>
               </a:rPr>
-              <a:t>максималния</a:t>
+              <a:t>максимална</a:t>
             </a:r>
             <a:r>
               <a:rPr lang="en-US" b="1" dirty="0">
@@ -18410,7 +18677,7 @@
             </a:r>
             <a:r>
               <a:rPr lang="bg-BG" dirty="0"/>
-              <a:t>от</a:t>
+              <a:t>стойност на</a:t>
             </a:r>
             <a:r>
               <a:rPr lang="en-US" dirty="0"/>
@@ -18492,7 +18759,7 @@
         </p:blipFill>
         <p:spPr bwMode="auto">
           <a:xfrm>
-            <a:off x="10436178" y="4689000"/>
+            <a:off x="10281000" y="2079000"/>
             <a:ext cx="1572320" cy="1572320"/>
           </a:xfrm>
           <a:prstGeom prst="rect">
@@ -19020,7 +19287,19 @@
             <a:pPr lvl="1"/>
             <a:r>
               <a:rPr lang="bg-BG" sz="2800" dirty="0"/>
-              <a:t>Проверява всеки един от елементите</a:t>
+              <a:t>Проверява </a:t>
+            </a:r>
+            <a:r>
+              <a:rPr lang="bg-BG" sz="2800" b="1" dirty="0">
+                <a:solidFill>
+                  <a:schemeClr val="bg1"/>
+                </a:solidFill>
+              </a:rPr>
+              <a:t>всеки един </a:t>
+            </a:r>
+            <a:r>
+              <a:rPr lang="bg-BG" sz="2800" dirty="0"/>
+              <a:t>от елементите</a:t>
             </a:r>
             <a:endParaRPr lang="en-US" sz="2800" dirty="0"/>
           </a:p>
@@ -19028,14 +19307,11 @@
             <a:pPr lvl="1"/>
             <a:r>
               <a:rPr lang="ru-RU" sz="2800" dirty="0"/>
-              <a:t>Един по един, в последователност</a:t>
-            </a:r>
-          </a:p>
-          <a:p>
-            <a:pPr lvl="1"/>
+              <a:t>Един по един, в последователност, д</a:t>
+            </a:r>
             <a:r>
               <a:rPr lang="bg-BG" sz="2800" dirty="0"/>
-              <a:t>Докато не е намерен желания елемент</a:t>
+              <a:t>окато не е намерен желания елемент</a:t>
             </a:r>
             <a:endParaRPr lang="en-US" sz="2800" dirty="0"/>
           </a:p>
@@ -19076,15 +19352,19 @@
                 <a:solidFill>
                   <a:schemeClr val="bg1"/>
                 </a:solidFill>
-                <a:hlinkClick r:id="rId2"/>
+                <a:hlinkClick r:id="rId2">
+                  <a:extLst>
+                    <a:ext uri="{A12FA001-AC4F-418D-AE19-62706E023703}">
+                      <ahyp:hlinkClr xmlns:ahyp="http://schemas.microsoft.com/office/drawing/2018/hyperlinkcolor" val="tx"/>
+                    </a:ext>
+                  </a:extLst>
+                </a:hlinkClick>
               </a:rPr>
               <a:t>визуализацията</a:t>
             </a:r>
             <a:endParaRPr lang="en-US" sz="3200" b="1" dirty="0">
               <a:solidFill>
-                <a:srgbClr val="FBEEC9">
-                  <a:lumMod val="75000"/>
-                </a:srgbClr>
+                <a:schemeClr val="bg1"/>
               </a:solidFill>
             </a:endParaRPr>
           </a:p>
@@ -19123,167 +19403,6 @@
               <a:t>Линейно търсене</a:t>
             </a:r>
             <a:endParaRPr lang="en-US" dirty="0"/>
-          </a:p>
-        </p:txBody>
-      </p:sp>
-      <p:sp>
-        <p:nvSpPr>
-          <p:cNvPr id="5" name="Rectangle 4"/>
-          <p:cNvSpPr>
-            <a:spLocks noChangeArrowheads="1"/>
-          </p:cNvSpPr>
-          <p:nvPr/>
-        </p:nvSpPr>
-        <p:spPr bwMode="auto">
-          <a:xfrm>
-            <a:off x="5262000" y="5288340"/>
-            <a:ext cx="6930000" cy="1569660"/>
-          </a:xfrm>
-          <a:prstGeom prst="rect">
-            <a:avLst/>
-          </a:prstGeom>
-          <a:solidFill>
-            <a:schemeClr val="accent5">
-              <a:lumMod val="40000"/>
-              <a:lumOff val="60000"/>
-              <a:alpha val="15000"/>
-            </a:schemeClr>
-          </a:solidFill>
-          <a:ln w="12700">
-            <a:solidFill>
-              <a:schemeClr val="accent5">
-                <a:lumMod val="60000"/>
-                <a:lumOff val="40000"/>
-              </a:schemeClr>
-            </a:solidFill>
-          </a:ln>
-        </p:spPr>
-        <p:txBody>
-          <a:bodyPr wrap="square">
-            <a:spAutoFit/>
-          </a:bodyPr>
-          <a:lstStyle/>
-          <a:p>
-            <a:pPr eaLnBrk="0" hangingPunct="0">
-              <a:buClr>
-                <a:schemeClr val="accent5">
-                  <a:lumMod val="40000"/>
-                  <a:lumOff val="60000"/>
-                </a:schemeClr>
-              </a:buClr>
-              <a:buSzPct val="70000"/>
-            </a:pPr>
-            <a:r>
-              <a:rPr lang="bg-BG" sz="2400" b="1" noProof="1">
-                <a:latin typeface="Consolas" pitchFamily="49" charset="0"/>
-                <a:cs typeface="Consolas" pitchFamily="49" charset="0"/>
-              </a:rPr>
-              <a:t>За всеки елемент в списъка</a:t>
-            </a:r>
-            <a:r>
-              <a:rPr lang="en-US" sz="2400" b="1" noProof="1">
-                <a:latin typeface="Consolas" pitchFamily="49" charset="0"/>
-                <a:cs typeface="Consolas" pitchFamily="49" charset="0"/>
-              </a:rPr>
-              <a:t>:</a:t>
-            </a:r>
-          </a:p>
-          <a:p>
-            <a:pPr eaLnBrk="0" hangingPunct="0">
-              <a:buClr>
-                <a:schemeClr val="accent5">
-                  <a:lumMod val="40000"/>
-                  <a:lumOff val="60000"/>
-                </a:schemeClr>
-              </a:buClr>
-              <a:buSzPct val="70000"/>
-            </a:pPr>
-            <a:r>
-              <a:rPr lang="en-US" sz="2400" b="1" noProof="1">
-                <a:latin typeface="Consolas" pitchFamily="49" charset="0"/>
-                <a:cs typeface="Consolas" pitchFamily="49" charset="0"/>
-              </a:rPr>
-              <a:t> </a:t>
-            </a:r>
-            <a:r>
-              <a:rPr lang="ru-RU" sz="2400" b="1" noProof="1">
-                <a:latin typeface="Consolas" pitchFamily="49" charset="0"/>
-                <a:cs typeface="Consolas" pitchFamily="49" charset="0"/>
-              </a:rPr>
-              <a:t>ако този елемент има желаната стойност</a:t>
-            </a:r>
-            <a:r>
-              <a:rPr lang="en-US" sz="2400" b="1" noProof="1">
-                <a:latin typeface="Consolas" pitchFamily="49" charset="0"/>
-                <a:cs typeface="Consolas" pitchFamily="49" charset="0"/>
-              </a:rPr>
-              <a:t>,</a:t>
-            </a:r>
-          </a:p>
-          <a:p>
-            <a:pPr eaLnBrk="0" hangingPunct="0">
-              <a:buClr>
-                <a:schemeClr val="accent5">
-                  <a:lumMod val="40000"/>
-                  <a:lumOff val="60000"/>
-                </a:schemeClr>
-              </a:buClr>
-              <a:buSzPct val="70000"/>
-            </a:pPr>
-            <a:r>
-              <a:rPr lang="en-US" sz="2400" b="1" noProof="1">
-                <a:latin typeface="Consolas" pitchFamily="49" charset="0"/>
-                <a:cs typeface="Consolas" pitchFamily="49" charset="0"/>
-              </a:rPr>
-              <a:t>    </a:t>
-            </a:r>
-            <a:r>
-              <a:rPr lang="bg-BG" sz="2400" b="1" noProof="1">
-                <a:latin typeface="Consolas" pitchFamily="49" charset="0"/>
-                <a:cs typeface="Consolas" pitchFamily="49" charset="0"/>
-              </a:rPr>
-              <a:t>връща мястото на стойността</a:t>
-            </a:r>
-            <a:endParaRPr lang="en-US" sz="2400" b="1" noProof="1">
-              <a:latin typeface="Consolas" pitchFamily="49" charset="0"/>
-              <a:cs typeface="Consolas" pitchFamily="49" charset="0"/>
-            </a:endParaRPr>
-          </a:p>
-          <a:p>
-            <a:pPr eaLnBrk="0" hangingPunct="0">
-              <a:buClr>
-                <a:schemeClr val="accent5">
-                  <a:lumMod val="40000"/>
-                  <a:lumOff val="60000"/>
-                </a:schemeClr>
-              </a:buClr>
-              <a:buSzPct val="70000"/>
-            </a:pPr>
-            <a:r>
-              <a:rPr lang="bg-BG" sz="2400" b="1" noProof="1">
-                <a:latin typeface="Consolas" pitchFamily="49" charset="0"/>
-                <a:cs typeface="Consolas" pitchFamily="49" charset="0"/>
-              </a:rPr>
-              <a:t>връща</a:t>
-            </a:r>
-            <a:r>
-              <a:rPr lang="en-US" sz="2400" b="1" noProof="1">
-                <a:latin typeface="Consolas" pitchFamily="49" charset="0"/>
-                <a:cs typeface="Consolas" pitchFamily="49" charset="0"/>
-              </a:rPr>
-              <a:t> </a:t>
-            </a:r>
-            <a:r>
-              <a:rPr lang="bg-BG" sz="2400" b="1" noProof="1">
-                <a:latin typeface="Consolas" pitchFamily="49" charset="0"/>
-                <a:cs typeface="Consolas" pitchFamily="49" charset="0"/>
-              </a:rPr>
-              <a:t>нищо</a:t>
-            </a:r>
-            <a:endParaRPr lang="en-US" sz="2400" b="1" noProof="1">
-              <a:latin typeface="Consolas" pitchFamily="49" charset="0"/>
-              <a:cs typeface="Consolas" pitchFamily="49" charset="0"/>
-            </a:endParaRPr>
           </a:p>
         </p:txBody>
       </p:sp>
@@ -19515,7 +19634,7 @@
                             </p:stCondLst>
                             <p:childTnLst>
                               <p:par>
-                                <p:cTn id="17" presetID="1" presetClass="entr" presetSubtype="0" fill="hold" grpId="0" nodeType="clickEffect">
+                                <p:cTn id="17" presetID="1" presetClass="entr" presetSubtype="0" fill="hold" nodeType="clickEffect">
                                   <p:stCondLst>
                                     <p:cond delay="0"/>
                                   </p:stCondLst>
@@ -19528,103 +19647,9 @@
                                           </p:stCondLst>
                                         </p:cTn>
                                         <p:tgtEl>
-                                          <p:spTgt spid="5"/>
-                                        </p:tgtEl>
-                                        <p:attrNameLst>
-                                          <p:attrName>style.visibility</p:attrName>
-                                        </p:attrNameLst>
-                                      </p:cBhvr>
-                                      <p:to>
-                                        <p:strVal val="visible"/>
-                                      </p:to>
-                                    </p:set>
-                                  </p:childTnLst>
-                                </p:cTn>
-                              </p:par>
-                            </p:childTnLst>
-                          </p:cTn>
-                        </p:par>
-                      </p:childTnLst>
-                    </p:cTn>
-                  </p:par>
-                  <p:par>
-                    <p:cTn id="19" fill="hold">
-                      <p:stCondLst>
-                        <p:cond delay="indefinite"/>
-                      </p:stCondLst>
-                      <p:childTnLst>
-                        <p:par>
-                          <p:cTn id="20" fill="hold">
-                            <p:stCondLst>
-                              <p:cond delay="0"/>
-                            </p:stCondLst>
-                            <p:childTnLst>
-                              <p:par>
-                                <p:cTn id="21" presetID="1" presetClass="entr" presetSubtype="0" fill="hold" nodeType="clickEffect">
-                                  <p:stCondLst>
-                                    <p:cond delay="0"/>
-                                  </p:stCondLst>
-                                  <p:childTnLst>
-                                    <p:set>
-                                      <p:cBhvr>
-                                        <p:cTn id="22" dur="1" fill="hold">
-                                          <p:stCondLst>
-                                            <p:cond delay="0"/>
-                                          </p:stCondLst>
-                                        </p:cTn>
-                                        <p:tgtEl>
                                           <p:spTgt spid="2">
                                             <p:txEl>
                                               <p:pRg st="4" end="4"/>
-                                            </p:txEl>
-                                          </p:spTgt>
-                                        </p:tgtEl>
-                                        <p:attrNameLst>
-                                          <p:attrName>style.visibility</p:attrName>
-                                        </p:attrNameLst>
-                                      </p:cBhvr>
-                                      <p:to>
-                                        <p:strVal val="visible"/>
-                                      </p:to>
-                                    </p:set>
-                                  </p:childTnLst>
-                                </p:cTn>
-                              </p:par>
-                            </p:childTnLst>
-                          </p:cTn>
-                        </p:par>
-                      </p:childTnLst>
-                    </p:cTn>
-                  </p:par>
-                  <p:par>
-                    <p:cTn id="23" fill="hold">
-                      <p:stCondLst>
-                        <p:cond delay="indefinite"/>
-                      </p:stCondLst>
-                      <p:childTnLst>
-                        <p:par>
-                          <p:cTn id="24" fill="hold">
-                            <p:stCondLst>
-                              <p:cond delay="0"/>
-                            </p:stCondLst>
-                            <p:childTnLst>
-                              <p:par>
-                                <p:cTn id="25" presetID="1" presetClass="entr" presetSubtype="0" fill="hold" nodeType="clickEffect">
-                                  <p:stCondLst>
-                                    <p:cond delay="0"/>
-                                  </p:stCondLst>
-                                  <p:childTnLst>
-                                    <p:set>
-                                      <p:cBhvr>
-                                        <p:cTn id="26" dur="1" fill="hold">
-                                          <p:stCondLst>
-                                            <p:cond delay="0"/>
-                                          </p:stCondLst>
-                                        </p:cTn>
-                                        <p:tgtEl>
-                                          <p:spTgt spid="2">
-                                            <p:txEl>
-                                              <p:pRg st="5" end="5"/>
                                             </p:txEl>
                                           </p:spTgt>
                                         </p:tgtEl>
@@ -19666,9 +19691,6 @@
         </p:cTn>
       </p:par>
     </p:tnLst>
-    <p:bldLst>
-      <p:bldP spid="5" grpId="0" animBg="1"/>
-    </p:bldLst>
   </p:timing>
 </p:sld>
 </file>
@@ -19727,7 +19749,7 @@
             </a:r>
             <a:r>
               <a:rPr lang="bg-BG" sz="3199" dirty="0"/>
-              <a:t>намира на елемент </a:t>
+              <a:t>намира елемент </a:t>
             </a:r>
             <a:r>
               <a:rPr lang="ru-RU" sz="3199" dirty="0"/>
@@ -19743,7 +19765,7 @@
             </a:pPr>
             <a:r>
               <a:rPr lang="bg-BG" sz="3199" dirty="0"/>
-              <a:t>През всяка стъпка</a:t>
+              <a:t>При всяка стъпка</a:t>
             </a:r>
             <a:r>
               <a:rPr lang="en-US" sz="3199" dirty="0"/>
@@ -19751,9 +19773,33 @@
             </a:r>
             <a:r>
               <a:rPr lang="bg-BG" sz="3199" dirty="0"/>
-              <a:t> сравнява входа със средния елемент</a:t>
-            </a:r>
-            <a:endParaRPr lang="en-US" sz="3199" dirty="0"/>
+              <a:t> </a:t>
+            </a:r>
+            <a:r>
+              <a:rPr lang="bg-BG" sz="3199" b="1" dirty="0">
+                <a:solidFill>
+                  <a:schemeClr val="bg1"/>
+                </a:solidFill>
+              </a:rPr>
+              <a:t>сравнява входа </a:t>
+            </a:r>
+            <a:r>
+              <a:rPr lang="bg-BG" sz="3199" dirty="0"/>
+              <a:t>със </a:t>
+            </a:r>
+            <a:r>
+              <a:rPr lang="bg-BG" sz="3199" b="1" dirty="0">
+                <a:solidFill>
+                  <a:schemeClr val="bg1"/>
+                </a:solidFill>
+              </a:rPr>
+              <a:t>средния елемент</a:t>
+            </a:r>
+            <a:endParaRPr lang="en-US" sz="3199" b="1" dirty="0">
+              <a:solidFill>
+                <a:schemeClr val="bg1"/>
+              </a:solidFill>
+            </a:endParaRPr>
           </a:p>
           <a:p>
             <a:pPr lvl="1" latinLnBrk="1">
@@ -19846,8 +19892,8 @@
         </p:blipFill>
         <p:spPr bwMode="auto">
           <a:xfrm>
-            <a:off x="9243667" y="5062500"/>
-            <a:ext cx="2509363" cy="1741500"/>
+            <a:off x="9336000" y="5214566"/>
+            <a:ext cx="2269450" cy="1575000"/>
           </a:xfrm>
           <a:prstGeom prst="rect">
             <a:avLst/>
@@ -20298,7 +20344,7 @@
             </a:r>
             <a:r>
               <a:rPr lang="bg-BG" dirty="0"/>
-              <a:t>Код</a:t>
+              <a:t>код</a:t>
             </a:r>
             <a:endParaRPr lang="en-US" dirty="0"/>
           </a:p>
@@ -21312,7 +21358,7 @@
             </a:pPr>
             <a:r>
               <a:rPr lang="bg-BG" sz="2799" dirty="0"/>
-              <a:t>Подобно на начина, на който хората търсят в телефонния указател</a:t>
+              <a:t>Подобно на начина, по който хората търсят в телефонния указател</a:t>
             </a:r>
             <a:endParaRPr lang="en-US" sz="2799" dirty="0"/>
           </a:p>
@@ -21486,8 +21532,8 @@
         </p:blipFill>
         <p:spPr bwMode="auto">
           <a:xfrm>
-            <a:off x="8565243" y="4956746"/>
-            <a:ext cx="3371494" cy="1901254"/>
+            <a:off x="8935410" y="5032521"/>
+            <a:ext cx="3237123" cy="1825479"/>
           </a:xfrm>
           <a:prstGeom prst="rect">
             <a:avLst/>
@@ -21511,136 +21557,6 @@
           </a:extLst>
         </p:spPr>
       </p:pic>
-      <p:sp>
-        <p:nvSpPr>
-          <p:cNvPr id="7" name="Slide Number">
-            <a:extLst>
-              <a:ext uri="{FF2B5EF4-FFF2-40B4-BE49-F238E27FC236}">
-                <a16:creationId xmlns:a16="http://schemas.microsoft.com/office/drawing/2014/main" id="{A35BC18D-94A6-42D0-8F54-E6FC74FEE157}"/>
-              </a:ext>
-            </a:extLst>
-          </p:cNvPr>
-          <p:cNvSpPr txBox="1">
-            <a:spLocks/>
-          </p:cNvSpPr>
-          <p:nvPr/>
-        </p:nvSpPr>
-        <p:spPr>
-          <a:xfrm>
-            <a:off x="11753030" y="6507000"/>
-            <a:ext cx="367414" cy="297000"/>
-          </a:xfrm>
-          <a:prstGeom prst="rect">
-            <a:avLst/>
-          </a:prstGeom>
-        </p:spPr>
-        <p:txBody>
-          <a:bodyPr vert="horz" lIns="91440" tIns="45720" rIns="91440" bIns="45720" rtlCol="0" anchor="b"/>
-          <a:lstStyle>
-            <a:defPPr>
-              <a:defRPr lang="en-US"/>
-            </a:defPPr>
-            <a:lvl1pPr marL="0" algn="r" defTabSz="914400" rtl="0" eaLnBrk="1" latinLnBrk="0" hangingPunct="1">
-              <a:defRPr sz="1000" kern="1200">
-                <a:solidFill>
-                  <a:schemeClr val="tx1"/>
-                </a:solidFill>
-                <a:latin typeface="+mn-lt"/>
-                <a:ea typeface="+mn-ea"/>
-                <a:cs typeface="+mn-cs"/>
-              </a:defRPr>
-            </a:lvl1pPr>
-            <a:lvl2pPr marL="457200" algn="l" defTabSz="914400" rtl="0" eaLnBrk="1" latinLnBrk="0" hangingPunct="1">
-              <a:defRPr sz="1800" kern="1200">
-                <a:solidFill>
-                  <a:schemeClr val="tx1"/>
-                </a:solidFill>
-                <a:latin typeface="+mn-lt"/>
-                <a:ea typeface="+mn-ea"/>
-                <a:cs typeface="+mn-cs"/>
-              </a:defRPr>
-            </a:lvl2pPr>
-            <a:lvl3pPr marL="914400" algn="l" defTabSz="914400" rtl="0" eaLnBrk="1" latinLnBrk="0" hangingPunct="1">
-              <a:defRPr sz="1800" kern="1200">
-                <a:solidFill>
-                  <a:schemeClr val="tx1"/>
-                </a:solidFill>
-                <a:latin typeface="+mn-lt"/>
-                <a:ea typeface="+mn-ea"/>
-                <a:cs typeface="+mn-cs"/>
-              </a:defRPr>
-            </a:lvl3pPr>
-            <a:lvl4pPr marL="1371600" algn="l" defTabSz="914400" rtl="0" eaLnBrk="1" latinLnBrk="0" hangingPunct="1">
-              <a:defRPr sz="1800" kern="1200">
-                <a:solidFill>
-                  <a:schemeClr val="tx1"/>
-                </a:solidFill>
-                <a:latin typeface="+mn-lt"/>
-                <a:ea typeface="+mn-ea"/>
-                <a:cs typeface="+mn-cs"/>
-              </a:defRPr>
-            </a:lvl4pPr>
-            <a:lvl5pPr marL="1828800" algn="l" defTabSz="914400" rtl="0" eaLnBrk="1" latinLnBrk="0" hangingPunct="1">
-              <a:defRPr sz="1800" kern="1200">
-                <a:solidFill>
-                  <a:schemeClr val="tx1"/>
-                </a:solidFill>
-                <a:latin typeface="+mn-lt"/>
-                <a:ea typeface="+mn-ea"/>
-                <a:cs typeface="+mn-cs"/>
-              </a:defRPr>
-            </a:lvl5pPr>
-            <a:lvl6pPr marL="2286000" algn="l" defTabSz="914400" rtl="0" eaLnBrk="1" latinLnBrk="0" hangingPunct="1">
-              <a:defRPr sz="1800" kern="1200">
-                <a:solidFill>
-                  <a:schemeClr val="tx1"/>
-                </a:solidFill>
-                <a:latin typeface="+mn-lt"/>
-                <a:ea typeface="+mn-ea"/>
-                <a:cs typeface="+mn-cs"/>
-              </a:defRPr>
-            </a:lvl6pPr>
-            <a:lvl7pPr marL="2743200" algn="l" defTabSz="914400" rtl="0" eaLnBrk="1" latinLnBrk="0" hangingPunct="1">
-              <a:defRPr sz="1800" kern="1200">
-                <a:solidFill>
-                  <a:schemeClr val="tx1"/>
-                </a:solidFill>
-                <a:latin typeface="+mn-lt"/>
-                <a:ea typeface="+mn-ea"/>
-                <a:cs typeface="+mn-cs"/>
-              </a:defRPr>
-            </a:lvl7pPr>
-            <a:lvl8pPr marL="3200400" algn="l" defTabSz="914400" rtl="0" eaLnBrk="1" latinLnBrk="0" hangingPunct="1">
-              <a:defRPr sz="1800" kern="1200">
-                <a:solidFill>
-                  <a:schemeClr val="tx1"/>
-                </a:solidFill>
-                <a:latin typeface="+mn-lt"/>
-                <a:ea typeface="+mn-ea"/>
-                <a:cs typeface="+mn-cs"/>
-              </a:defRPr>
-            </a:lvl8pPr>
-            <a:lvl9pPr marL="3657600" algn="l" defTabSz="914400" rtl="0" eaLnBrk="1" latinLnBrk="0" hangingPunct="1">
-              <a:defRPr sz="1800" kern="1200">
-                <a:solidFill>
-                  <a:schemeClr val="tx1"/>
-                </a:solidFill>
-                <a:latin typeface="+mn-lt"/>
-                <a:ea typeface="+mn-ea"/>
-                <a:cs typeface="+mn-cs"/>
-              </a:defRPr>
-            </a:lvl9pPr>
-          </a:lstStyle>
-          <a:p>
-            <a:fld id="{2BF067CD-8E6B-4360-9AA8-C5DF2A48A6D1}" type="slidenum">
-              <a:rPr lang="en-US" smtClean="0"/>
-              <a:pPr/>
-              <a:t>28</a:t>
-            </a:fld>
-            <a:endParaRPr lang="en-US" dirty="0"/>
-          </a:p>
-        </p:txBody>
-      </p:sp>
     </p:spTree>
     <p:extLst>
       <p:ext uri="{BB962C8B-B14F-4D97-AF65-F5344CB8AC3E}">
@@ -22036,7 +21952,7 @@
             </a:r>
             <a:r>
               <a:rPr lang="bg-BG" sz="3999" dirty="0"/>
-              <a:t>Код</a:t>
+              <a:t>код</a:t>
             </a:r>
             <a:endParaRPr lang="en-US" dirty="0"/>
           </a:p>
@@ -23063,6 +22979,43 @@
       </p:grpSpPr>
       <p:sp>
         <p:nvSpPr>
+          <p:cNvPr id="4" name="Subtitle 3">
+            <a:extLst>
+              <a:ext uri="{FF2B5EF4-FFF2-40B4-BE49-F238E27FC236}">
+                <a16:creationId xmlns:a16="http://schemas.microsoft.com/office/drawing/2014/main" id="{B49409A1-E131-920B-57D8-87B4905E39BA}"/>
+              </a:ext>
+            </a:extLst>
+          </p:cNvPr>
+          <p:cNvSpPr>
+            <a:spLocks noGrp="1"/>
+          </p:cNvSpPr>
+          <p:nvPr>
+            <p:ph type="subTitle" sz="quarter" idx="11"/>
+          </p:nvPr>
+        </p:nvSpPr>
+        <p:spPr/>
+        <p:txBody>
+          <a:bodyPr/>
+          <a:lstStyle/>
+          <a:p>
+            <a:r>
+              <a:rPr lang="en-GB" dirty="0"/>
+              <a:t>Selection </a:t>
+            </a:r>
+            <a:r>
+              <a:rPr lang="bg-BG" dirty="0"/>
+              <a:t>и</a:t>
+            </a:r>
+            <a:r>
+              <a:rPr lang="en-GB" dirty="0"/>
+              <a:t> Bubble Sort</a:t>
+            </a:r>
+            <a:endParaRPr lang="en-BG" dirty="0"/>
+          </a:p>
+        </p:txBody>
+      </p:sp>
+      <p:sp>
+        <p:nvSpPr>
           <p:cNvPr id="2" name="Title 1"/>
           <p:cNvSpPr>
             <a:spLocks noGrp="1"/>
@@ -23077,16 +23030,8 @@
           <a:lstStyle/>
           <a:p>
             <a:r>
-              <a:rPr lang="en-GB" dirty="0"/>
-              <a:t>Selection Sort </a:t>
-            </a:r>
-            <a:r>
               <a:rPr lang="bg-BG" dirty="0"/>
-              <a:t>и</a:t>
-            </a:r>
-            <a:r>
-              <a:rPr lang="en-GB" dirty="0"/>
-              <a:t> Bubble Sort</a:t>
+              <a:t>Прости алгоритми за сортиране</a:t>
             </a:r>
             <a:endParaRPr lang="en-US" dirty="0"/>
           </a:p>
@@ -23172,6 +23117,47 @@
       </p:grpSpPr>
       <p:sp>
         <p:nvSpPr>
+          <p:cNvPr id="3" name="Subtitle 2">
+            <a:extLst>
+              <a:ext uri="{FF2B5EF4-FFF2-40B4-BE49-F238E27FC236}">
+                <a16:creationId xmlns:a16="http://schemas.microsoft.com/office/drawing/2014/main" id="{18C68496-7C30-A549-0BA6-A89BC5CCF1CC}"/>
+              </a:ext>
+            </a:extLst>
+          </p:cNvPr>
+          <p:cNvSpPr>
+            <a:spLocks noGrp="1"/>
+          </p:cNvSpPr>
+          <p:nvPr>
+            <p:ph type="subTitle" sz="quarter" idx="11"/>
+          </p:nvPr>
+        </p:nvSpPr>
+        <p:spPr/>
+        <p:txBody>
+          <a:bodyPr/>
+          <a:lstStyle/>
+          <a:p>
+            <a:r>
+              <a:rPr lang="bg-BG" dirty="0"/>
+              <a:t>Разбъркването на </a:t>
+            </a:r>
+            <a:r>
+              <a:rPr lang="en-US" dirty="0"/>
+              <a:t>Fisher</a:t>
+            </a:r>
+            <a:r>
+              <a:rPr lang="bg-BG" dirty="0"/>
+              <a:t> </a:t>
+            </a:r>
+            <a:r>
+              <a:rPr lang="en-US" dirty="0"/>
+              <a:t>Yates</a:t>
+            </a:r>
+            <a:endParaRPr lang="en-BG" dirty="0"/>
+          </a:p>
+        </p:txBody>
+      </p:sp>
+      <p:sp>
+        <p:nvSpPr>
           <p:cNvPr id="5" name="Заглавие 4">
             <a:extLst>
               <a:ext uri="{FF2B5EF4-FFF2-40B4-BE49-F238E27FC236}">
@@ -23192,20 +23178,8 @@
           <a:lstStyle/>
           <a:p>
             <a:r>
-              <a:rPr lang="bg-BG" dirty="0"/>
-              <a:t>Разбъркването на </a:t>
-            </a:r>
-            <a:r>
               <a:rPr lang="en-US" dirty="0"/>
-              <a:t>Fisher</a:t>
-            </a:r>
-            <a:r>
-              <a:rPr lang="bg-BG" dirty="0"/>
-              <a:t> </a:t>
-            </a:r>
-            <a:r>
-              <a:rPr lang="en-US" dirty="0"/>
-              <a:t>Yates</a:t>
+              <a:t>Shuffling</a:t>
             </a:r>
           </a:p>
         </p:txBody>
@@ -23324,8 +23298,16 @@
               <a:t> == </a:t>
             </a:r>
             <a:r>
+              <a:rPr lang="bg-BG" b="1" dirty="0">
+                <a:solidFill>
+                  <a:schemeClr val="bg1"/>
+                </a:solidFill>
+              </a:rPr>
+              <a:t>случайна</a:t>
+            </a:r>
+            <a:r>
               <a:rPr lang="bg-BG" dirty="0"/>
-              <a:t>случайна подредба на реда на елементите в колекцията</a:t>
+              <a:t> подредба на елементите в колекцията</a:t>
             </a:r>
             <a:endParaRPr lang="en-US" dirty="0"/>
           </a:p>
@@ -24394,7 +24376,7 @@
         </p:nvSpPr>
         <p:spPr bwMode="auto">
           <a:xfrm>
-            <a:off x="742394" y="4334329"/>
+            <a:off x="742394" y="4473727"/>
             <a:ext cx="7917938" cy="2153875"/>
           </a:xfrm>
           <a:prstGeom prst="rect">
@@ -24867,7 +24849,7 @@
         <p:spPr bwMode="auto">
           <a:xfrm>
             <a:off x="562443" y="1434289"/>
-            <a:ext cx="11067117" cy="5053914"/>
+            <a:ext cx="11067117" cy="5045869"/>
           </a:xfrm>
           <a:prstGeom prst="rect">
             <a:avLst/>
@@ -25033,7 +25015,47 @@
                 <a:latin typeface="Consolas" pitchFamily="49" charset="0"/>
                 <a:cs typeface="Consolas" pitchFamily="49" charset="0"/>
               </a:rPr>
-              <a:t>// Exchange array[i] with random element in array[i … n-1]</a:t>
+              <a:t>// </a:t>
+            </a:r>
+            <a:r>
+              <a:rPr lang="bg-BG" sz="2399" b="1" noProof="1">
+                <a:solidFill>
+                  <a:schemeClr val="accent2"/>
+                </a:solidFill>
+                <a:latin typeface="Consolas" pitchFamily="49" charset="0"/>
+                <a:cs typeface="Consolas" pitchFamily="49" charset="0"/>
+              </a:rPr>
+              <a:t>Разменяме</a:t>
+            </a:r>
+            <a:r>
+              <a:rPr lang="en-US" sz="2399" b="1" noProof="1">
+                <a:solidFill>
+                  <a:schemeClr val="accent2"/>
+                </a:solidFill>
+                <a:latin typeface="Consolas" pitchFamily="49" charset="0"/>
+                <a:cs typeface="Consolas" pitchFamily="49" charset="0"/>
+              </a:rPr>
+              <a:t> array[i] </a:t>
+            </a:r>
+            <a:r>
+              <a:rPr lang="bg-BG" sz="2399" b="1" noProof="1">
+                <a:solidFill>
+                  <a:schemeClr val="accent2"/>
+                </a:solidFill>
+                <a:latin typeface="Consolas" pitchFamily="49" charset="0"/>
+                <a:cs typeface="Consolas" pitchFamily="49" charset="0"/>
+              </a:rPr>
+              <a:t>със случаен елемент от</a:t>
+            </a:r>
+            <a:r>
+              <a:rPr lang="en-US" sz="2399" b="1" noProof="1">
+                <a:solidFill>
+                  <a:schemeClr val="accent2"/>
+                </a:solidFill>
+                <a:latin typeface="Consolas" pitchFamily="49" charset="0"/>
+                <a:cs typeface="Consolas" pitchFamily="49" charset="0"/>
+              </a:rPr>
+              <a:t> array[i … n-1]</a:t>
             </a:r>
           </a:p>
           <a:p>
@@ -25228,7 +25250,7 @@
             </a:r>
             <a:r>
               <a:rPr lang="bg-BG" dirty="0"/>
-              <a:t>Код</a:t>
+              <a:t>код</a:t>
             </a:r>
             <a:endParaRPr lang="en-US" dirty="0"/>
           </a:p>
@@ -26030,8 +26052,8 @@
         </p:nvSpPr>
         <p:spPr>
           <a:xfrm>
-            <a:off x="699284" y="1677242"/>
-            <a:ext cx="10869324" cy="4679858"/>
+            <a:off x="690507" y="1529323"/>
+            <a:ext cx="10869324" cy="5126177"/>
           </a:xfrm>
         </p:spPr>
         <p:txBody>
@@ -26103,7 +26125,7 @@
                   </a:schemeClr>
                 </a:solidFill>
               </a:rPr>
-              <a:t>Бавни</a:t>
+              <a:t>Прости</a:t>
             </a:r>
             <a:r>
               <a:rPr lang="en-US" sz="3600" dirty="0"/>
@@ -26170,7 +26192,7 @@
                   </a:schemeClr>
                 </a:solidFill>
               </a:rPr>
-              <a:t>Бързи</a:t>
+              <a:t>Сложни</a:t>
             </a:r>
             <a:r>
               <a:rPr lang="en-US" sz="3600" dirty="0"/>
@@ -26266,9 +26288,68 @@
               </a:rPr>
               <a:t>Двоично търсене, линейно търсене и интерполационно търсене</a:t>
             </a:r>
-            <a:endParaRPr lang="en-US" sz="3200" dirty="0">
+          </a:p>
+          <a:p>
+            <a:pPr marL="285496" indent="-353907">
+              <a:lnSpc>
+                <a:spcPct val="100000"/>
+              </a:lnSpc>
+              <a:buClr>
+                <a:schemeClr val="bg2"/>
+              </a:buClr>
+            </a:pPr>
+            <a:r>
+              <a:rPr lang="bg-BG" b="1" dirty="0">
+                <a:solidFill>
+                  <a:schemeClr val="bg1">
+                    <a:lumMod val="60000"/>
+                    <a:lumOff val="40000"/>
+                  </a:schemeClr>
+                </a:solidFill>
+              </a:rPr>
+              <a:t>Избиране</a:t>
+            </a:r>
+            <a:r>
+              <a:rPr lang="bg-BG" b="1" dirty="0">
+                <a:solidFill>
+                  <a:schemeClr val="bg1"/>
+                </a:solidFill>
+              </a:rPr>
+              <a:t> </a:t>
+            </a:r>
+            <a:r>
+              <a:rPr lang="bg-BG" dirty="0"/>
+              <a:t>на</a:t>
+            </a:r>
+            <a:r>
+              <a:rPr lang="bg-BG" b="1" dirty="0">
+                <a:solidFill>
+                  <a:schemeClr val="bg1"/>
+                </a:solidFill>
+              </a:rPr>
+              <a:t> </a:t>
+            </a:r>
+            <a:r>
+              <a:rPr lang="bg-BG" dirty="0"/>
+              <a:t>алгоритъм за </a:t>
+            </a:r>
+            <a:r>
+              <a:rPr lang="bg-BG" b="1" dirty="0">
+                <a:solidFill>
+                  <a:schemeClr val="bg1">
+                    <a:lumMod val="60000"/>
+                    <a:lumOff val="40000"/>
+                  </a:schemeClr>
+                </a:solidFill>
+              </a:rPr>
+              <a:t>сортиране</a:t>
+            </a:r>
+            <a:endParaRPr lang="en-US" sz="3400" dirty="0">
               <a:solidFill>
-                <a:schemeClr val="bg2"/>
+                <a:schemeClr val="bg1">
+                  <a:lumMod val="60000"/>
+                  <a:lumOff val="40000"/>
+                </a:schemeClr>
               </a:solidFill>
             </a:endParaRPr>
           </a:p>
@@ -26822,6 +26903,55 @@
                       </p:childTnLst>
                     </p:cTn>
                   </p:par>
+                  <p:par>
+                    <p:cTn id="35" fill="hold">
+                      <p:stCondLst>
+                        <p:cond delay="indefinite"/>
+                      </p:stCondLst>
+                      <p:childTnLst>
+                        <p:par>
+                          <p:cTn id="36" fill="hold">
+                            <p:stCondLst>
+                              <p:cond delay="0"/>
+                            </p:stCondLst>
+                            <p:childTnLst>
+                              <p:par>
+                                <p:cTn id="37" presetID="1" presetClass="entr" presetSubtype="0" fill="hold" nodeType="clickEffect">
+                                  <p:stCondLst>
+                                    <p:cond delay="0"/>
+                                  </p:stCondLst>
+                                  <p:childTnLst>
+                                    <p:set>
+                                      <p:cBhvr>
+                                        <p:cTn id="38" dur="1" fill="hold">
+                                          <p:stCondLst>
+                                            <p:cond delay="0"/>
+                                          </p:stCondLst>
+                                        </p:cTn>
+                                        <p:tgtEl>
+                                          <p:spTgt spid="14">
+                                            <p:txEl>
+                                              <p:pRg st="9" end="9"/>
+                                            </p:txEl>
+                                          </p:spTgt>
+                                        </p:tgtEl>
+                                        <p:attrNameLst>
+                                          <p:attrName>style.visibility</p:attrName>
+                                        </p:attrNameLst>
+                                      </p:cBhvr>
+                                      <p:to>
+                                        <p:strVal val="visible"/>
+                                      </p:to>
+                                    </p:set>
+                                  </p:childTnLst>
+                                </p:cTn>
+                              </p:par>
+                            </p:childTnLst>
+                          </p:cTn>
+                        </p:par>
+                      </p:childTnLst>
+                    </p:cTn>
+                  </p:par>
                 </p:childTnLst>
               </p:cTn>
               <p:prevCondLst>
@@ -27316,7 +27446,19 @@
             </a:pPr>
             <a:r>
               <a:rPr lang="bg-BG" dirty="0"/>
-              <a:t>В ненамаляващ ред</a:t>
+              <a:t>В </a:t>
+            </a:r>
+            <a:r>
+              <a:rPr lang="bg-BG" b="1" dirty="0">
+                <a:solidFill>
+                  <a:schemeClr val="bg1"/>
+                </a:solidFill>
+              </a:rPr>
+              <a:t>нарастващ</a:t>
+            </a:r>
+            <a:r>
+              <a:rPr lang="bg-BG" dirty="0"/>
+              <a:t> ред</a:t>
             </a:r>
           </a:p>
           <a:p>
@@ -27428,23 +27570,32 @@
             </a:r>
             <a:r>
               <a:rPr lang="bg-BG" dirty="0"/>
-              <a:t>на елементи</a:t>
+              <a:t>на елементите, подредени в </a:t>
+            </a:r>
+            <a:r>
+              <a:rPr lang="bg-BG" b="1" dirty="0">
+                <a:solidFill>
+                  <a:schemeClr val="bg1"/>
+                </a:solidFill>
+              </a:rPr>
+              <a:t>нарастващ</a:t>
+            </a:r>
+            <a:r>
+              <a:rPr lang="bg-BG" dirty="0"/>
+              <a:t> ред</a:t>
             </a:r>
             <a:endParaRPr lang="en-US" dirty="0"/>
           </a:p>
           <a:p>
-            <a:pPr lvl="2">
+            <a:pPr marL="442912" lvl="1" indent="0">
               <a:lnSpc>
                 <a:spcPct val="100000"/>
               </a:lnSpc>
               <a:buClr>
                 <a:schemeClr val="tx1"/>
               </a:buClr>
+              <a:buNone/>
             </a:pPr>
-            <a:r>
-              <a:rPr lang="bg-BG" dirty="0"/>
-              <a:t>В ненамаляващ ред</a:t>
-            </a:r>
             <a:endParaRPr lang="en-US" dirty="0"/>
           </a:p>
         </p:txBody>
@@ -27852,55 +28003,6 @@
                       </p:childTnLst>
                     </p:cTn>
                   </p:par>
-                  <p:par>
-                    <p:cTn id="27" fill="hold">
-                      <p:stCondLst>
-                        <p:cond delay="indefinite"/>
-                      </p:stCondLst>
-                      <p:childTnLst>
-                        <p:par>
-                          <p:cTn id="28" fill="hold">
-                            <p:stCondLst>
-                              <p:cond delay="0"/>
-                            </p:stCondLst>
-                            <p:childTnLst>
-                              <p:par>
-                                <p:cTn id="29" presetID="1" presetClass="entr" presetSubtype="0" fill="hold" nodeType="clickEffect">
-                                  <p:stCondLst>
-                                    <p:cond delay="0"/>
-                                  </p:stCondLst>
-                                  <p:childTnLst>
-                                    <p:set>
-                                      <p:cBhvr>
-                                        <p:cTn id="30" dur="1" fill="hold">
-                                          <p:stCondLst>
-                                            <p:cond delay="0"/>
-                                          </p:stCondLst>
-                                        </p:cTn>
-                                        <p:tgtEl>
-                                          <p:spTgt spid="3">
-                                            <p:txEl>
-                                              <p:pRg st="7" end="7"/>
-                                            </p:txEl>
-                                          </p:spTgt>
-                                        </p:tgtEl>
-                                        <p:attrNameLst>
-                                          <p:attrName>style.visibility</p:attrName>
-                                        </p:attrNameLst>
-                                      </p:cBhvr>
-                                      <p:to>
-                                        <p:strVal val="visible"/>
-                                      </p:to>
-                                    </p:set>
-                                  </p:childTnLst>
-                                </p:cTn>
-                              </p:par>
-                            </p:childTnLst>
-                          </p:cTn>
-                        </p:par>
-                      </p:childTnLst>
-                    </p:cTn>
-                  </p:par>
                 </p:childTnLst>
               </p:cTn>
               <p:prevCondLst>
@@ -27960,15 +28062,15 @@
           <a:p>
             <a:r>
               <a:rPr lang="bg-BG" dirty="0"/>
-              <a:t>Сортиране</a:t>
+              <a:t>Сортиране:</a:t>
             </a:r>
             <a:r>
               <a:rPr lang="en-US" dirty="0"/>
-              <a:t> – </a:t>
+              <a:t> </a:t>
             </a:r>
             <a:r>
               <a:rPr lang="bg-BG" dirty="0"/>
-              <a:t>Примери</a:t>
+              <a:t>пример</a:t>
             </a:r>
             <a:endParaRPr lang="en-US" dirty="0"/>
           </a:p>
@@ -28002,15 +28104,15 @@
               </a:lnSpc>
             </a:pPr>
             <a:r>
-              <a:rPr lang="bg-BG" dirty="0"/>
+              <a:rPr lang="bg-BG" sz="3100" dirty="0"/>
               <a:t>Ефективните</a:t>
             </a:r>
             <a:r>
-              <a:rPr lang="en-US" dirty="0"/>
+              <a:rPr lang="en-US" sz="3100" dirty="0"/>
               <a:t> </a:t>
             </a:r>
             <a:r>
-              <a:rPr lang="bg-BG" b="1" dirty="0">
+              <a:rPr lang="bg-BG" sz="3100" b="1" dirty="0">
                 <a:solidFill>
                   <a:schemeClr val="bg1"/>
                 </a:solidFill>
@@ -28018,7 +28120,7 @@
               <a:t>алгоритми за сортиране</a:t>
             </a:r>
             <a:r>
-              <a:rPr lang="en-US" b="1" dirty="0">
+              <a:rPr lang="en-US" sz="3100" b="1" dirty="0">
                 <a:solidFill>
                   <a:schemeClr val="bg1"/>
                 </a:solidFill>
@@ -28026,11 +28128,11 @@
               <a:t> </a:t>
             </a:r>
             <a:r>
-              <a:rPr lang="bg-BG" dirty="0"/>
+              <a:rPr lang="bg-BG" sz="3100" dirty="0"/>
               <a:t>са важни за</a:t>
             </a:r>
             <a:r>
-              <a:rPr lang="en-US" dirty="0"/>
+              <a:rPr lang="en-US" sz="3100" dirty="0"/>
               <a:t>:</a:t>
             </a:r>
           </a:p>
@@ -28041,8 +28143,20 @@
               </a:lnSpc>
             </a:pPr>
             <a:r>
-              <a:rPr lang="ru-RU" dirty="0"/>
-              <a:t>Изготвяне на четими за човека резултати</a:t>
+              <a:rPr lang="ru-RU" sz="3100" dirty="0"/>
+              <a:t>Изготвяне на </a:t>
+            </a:r>
+            <a:r>
+              <a:rPr lang="ru-RU" sz="3100" b="1" dirty="0">
+                <a:solidFill>
+                  <a:schemeClr val="bg1"/>
+                </a:solidFill>
+              </a:rPr>
+              <a:t>четими</a:t>
+            </a:r>
+            <a:r>
+              <a:rPr lang="ru-RU" sz="3100" dirty="0"/>
+              <a:t> за човека резултати</a:t>
             </a:r>
           </a:p>
           <a:p>
@@ -28052,15 +28166,15 @@
               </a:lnSpc>
             </a:pPr>
             <a:r>
-              <a:rPr lang="bg-BG" noProof="1"/>
+              <a:rPr lang="bg-BG" sz="3100" noProof="1"/>
               <a:t>Канолизиране на данни </a:t>
             </a:r>
             <a:r>
-              <a:rPr lang="en-US" dirty="0"/>
+              <a:rPr lang="en-US" sz="3100" dirty="0"/>
               <a:t>– </a:t>
             </a:r>
             <a:r>
-              <a:rPr lang="bg-BG" b="1" dirty="0">
+              <a:rPr lang="bg-BG" sz="3100" b="1" dirty="0">
                 <a:solidFill>
                   <a:schemeClr val="bg1"/>
                 </a:solidFill>
@@ -28068,10 +28182,22 @@
               <a:t>осигурява</a:t>
             </a:r>
             <a:r>
-              <a:rPr lang="bg-BG" dirty="0"/>
-              <a:t> уникална подредба на данните</a:t>
-            </a:r>
-            <a:endParaRPr lang="en-US" b="1" dirty="0">
+              <a:rPr lang="bg-BG" sz="3100" dirty="0"/>
+              <a:t> </a:t>
+            </a:r>
+            <a:r>
+              <a:rPr lang="bg-BG" sz="3100" b="1" dirty="0">
+                <a:solidFill>
+                  <a:schemeClr val="bg1"/>
+                </a:solidFill>
+              </a:rPr>
+              <a:t>уникална подредба </a:t>
+            </a:r>
+            <a:r>
+              <a:rPr lang="bg-BG" sz="3100" dirty="0"/>
+              <a:t>на данните</a:t>
+            </a:r>
+            <a:endParaRPr lang="en-US" sz="3100" b="1" dirty="0">
               <a:solidFill>
                 <a:schemeClr val="bg1"/>
               </a:solidFill>
@@ -28084,30 +28210,30 @@
               </a:lnSpc>
             </a:pPr>
             <a:r>
-              <a:rPr lang="bg-BG" dirty="0"/>
-              <a:t>В комбинация с други алгоритми</a:t>
-            </a:r>
-            <a:r>
-              <a:rPr lang="en-US" dirty="0"/>
-              <a:t>, </a:t>
-            </a:r>
-            <a:r>
-              <a:rPr lang="bg-BG" dirty="0"/>
+              <a:rPr lang="bg-BG" sz="3100" dirty="0"/>
+              <a:t>Може да се комбинира с други алгоритми</a:t>
+            </a:r>
+            <a:r>
+              <a:rPr lang="en-US" sz="3100" dirty="0"/>
+              <a:t> </a:t>
+            </a:r>
+            <a:r>
+              <a:rPr lang="bg-BG" sz="3100" dirty="0"/>
               <a:t>като</a:t>
             </a:r>
             <a:r>
-              <a:rPr lang="en-US" dirty="0"/>
+              <a:rPr lang="en-US" sz="3100" dirty="0"/>
               <a:t> </a:t>
             </a:r>
             <a:r>
-              <a:rPr lang="bg-BG" b="1" dirty="0">
+              <a:rPr lang="bg-BG" sz="3100" b="1" dirty="0">
                 <a:solidFill>
                   <a:schemeClr val="bg1"/>
                 </a:solidFill>
               </a:rPr>
               <a:t>алгоритъм за двоично търсене</a:t>
             </a:r>
-            <a:endParaRPr lang="en-US" b="1" dirty="0">
+            <a:endParaRPr lang="en-US" sz="3100" b="1" dirty="0">
               <a:solidFill>
                 <a:schemeClr val="bg1"/>
               </a:solidFill>
@@ -28123,11 +28249,11 @@
               </a:spcBef>
             </a:pPr>
             <a:r>
-              <a:rPr lang="bg-BG" dirty="0"/>
-              <a:t>Примери за сортиране</a:t>
-            </a:r>
-            <a:r>
-              <a:rPr lang="en-US" dirty="0"/>
+              <a:rPr lang="bg-BG" sz="3100" dirty="0"/>
+              <a:t>Пример за сортиране</a:t>
+            </a:r>
+            <a:r>
+              <a:rPr lang="en-US" sz="3100" dirty="0"/>
               <a:t>:</a:t>
             </a:r>
           </a:p>
@@ -28142,13 +28268,13 @@
           <p:nvPr>
             <p:extLst>
               <p:ext uri="{D42A27DB-BD31-4B8C-83A1-F6EECF244321}">
-                <p14:modId xmlns:p14="http://schemas.microsoft.com/office/powerpoint/2010/main" val="1556444707"/>
+                <p14:modId xmlns:p14="http://schemas.microsoft.com/office/powerpoint/2010/main" val="3607478584"/>
               </p:ext>
             </p:extLst>
           </p:nvPr>
         </p:nvGraphicFramePr>
         <p:xfrm>
-          <a:off x="1747375" y="5995448"/>
+          <a:off x="1747375" y="6079183"/>
           <a:ext cx="2666305" cy="438888"/>
         </p:xfrm>
         <a:graphic>
@@ -28745,7 +28871,7 @@
         </p:nvSpPr>
         <p:spPr>
           <a:xfrm>
-            <a:off x="1592724" y="5386710"/>
+            <a:off x="1592724" y="5470445"/>
             <a:ext cx="3130985" cy="523092"/>
           </a:xfrm>
           <a:prstGeom prst="rect">
@@ -28776,13 +28902,13 @@
           <p:nvPr>
             <p:extLst>
               <p:ext uri="{D42A27DB-BD31-4B8C-83A1-F6EECF244321}">
-                <p14:modId xmlns:p14="http://schemas.microsoft.com/office/powerpoint/2010/main" val="4113052159"/>
+                <p14:modId xmlns:p14="http://schemas.microsoft.com/office/powerpoint/2010/main" val="353885811"/>
               </p:ext>
             </p:extLst>
           </p:nvPr>
         </p:nvGraphicFramePr>
         <p:xfrm>
-          <a:off x="7243295" y="5995448"/>
+          <a:off x="7243295" y="6079183"/>
           <a:ext cx="2666305" cy="438888"/>
         </p:xfrm>
         <a:graphic>
@@ -29379,7 +29505,7 @@
         </p:nvSpPr>
         <p:spPr>
           <a:xfrm>
-            <a:off x="7138896" y="5435725"/>
+            <a:off x="7138896" y="5519460"/>
             <a:ext cx="2767104" cy="523092"/>
           </a:xfrm>
           <a:prstGeom prst="rect">
@@ -29424,7 +29550,7 @@
         </p:blipFill>
         <p:spPr bwMode="auto">
           <a:xfrm>
-            <a:off x="5251882" y="5672445"/>
+            <a:off x="5251882" y="5756180"/>
             <a:ext cx="1084805" cy="1084805"/>
           </a:xfrm>
           <a:prstGeom prst="rect">
@@ -29450,7 +29576,7 @@
         </p:nvCxnSpPr>
         <p:spPr>
           <a:xfrm>
-            <a:off x="4653170" y="6205705"/>
+            <a:off x="4653170" y="6289440"/>
             <a:ext cx="457081" cy="0"/>
           </a:xfrm>
           <a:prstGeom prst="straightConnector1">
@@ -29486,7 +29612,7 @@
         </p:nvCxnSpPr>
         <p:spPr>
           <a:xfrm>
-            <a:off x="6557674" y="6200541"/>
+            <a:off x="6557674" y="6284276"/>
             <a:ext cx="457081" cy="0"/>
           </a:xfrm>
           <a:prstGeom prst="straightConnector1">
@@ -29522,7 +29648,7 @@
         </p:nvSpPr>
         <p:spPr>
           <a:xfrm>
-            <a:off x="4935646" y="5331735"/>
+            <a:off x="4935646" y="5415470"/>
             <a:ext cx="1622028" cy="354512"/>
           </a:xfrm>
           <a:prstGeom prst="rect">
@@ -30107,7 +30233,7 @@
             </a:r>
             <a:r>
               <a:rPr lang="bg-BG" dirty="0"/>
-              <a:t>Класифициране</a:t>
+              <a:t>класифициране</a:t>
             </a:r>
             <a:endParaRPr lang="en-US" dirty="0"/>
           </a:p>
@@ -30188,9 +30314,21 @@
             </a:r>
             <a:r>
               <a:rPr lang="bg-BG" dirty="0"/>
-              <a:t>и използване на памет</a:t>
-            </a:r>
-            <a:endParaRPr lang="en-US" dirty="0"/>
+              <a:t>и използване на </a:t>
+            </a:r>
+            <a:r>
+              <a:rPr lang="bg-BG" b="1" dirty="0">
+                <a:solidFill>
+                  <a:schemeClr val="bg1"/>
+                </a:solidFill>
+              </a:rPr>
+              <a:t>памет</a:t>
+            </a:r>
+            <a:endParaRPr lang="en-US" b="1" dirty="0">
+              <a:solidFill>
+                <a:schemeClr val="bg1"/>
+              </a:solidFill>
+            </a:endParaRPr>
           </a:p>
           <a:p>
             <a:pPr lvl="2">
@@ -30200,7 +30338,7 @@
             </a:pPr>
             <a:r>
               <a:rPr lang="bg-BG" dirty="0"/>
-              <a:t>Лош</a:t>
+              <a:t>Най-лош</a:t>
             </a:r>
             <a:r>
               <a:rPr lang="en-US" dirty="0"/>
@@ -30238,11 +30376,7 @@
               </a:buClr>
             </a:pPr>
             <a:r>
-              <a:rPr lang="bg-BG" b="1" dirty="0">
-                <a:solidFill>
-                  <a:schemeClr val="bg1"/>
-                </a:solidFill>
-              </a:rPr>
+              <a:rPr lang="bg-BG" dirty="0"/>
               <a:t>Рекурсивен</a:t>
             </a:r>
             <a:r>
@@ -30265,20 +30399,8 @@
               </a:buClr>
             </a:pPr>
             <a:r>
-              <a:rPr lang="bg-BG" b="1" dirty="0">
-                <a:solidFill>
-                  <a:schemeClr val="bg1"/>
-                </a:solidFill>
-              </a:rPr>
-              <a:t>Стабилност</a:t>
-            </a:r>
-            <a:r>
-              <a:rPr lang="en-US" dirty="0"/>
-              <a:t> – </a:t>
-            </a:r>
-            <a:r>
               <a:rPr lang="bg-BG" dirty="0"/>
-              <a:t>стабилен</a:t>
+              <a:t>Стабилен</a:t>
             </a:r>
             <a:r>
               <a:rPr lang="en-US" dirty="0"/>
@@ -30316,10 +30438,18 @@
               <a:t>/ </a:t>
             </a:r>
             <a:r>
-              <a:rPr lang="bg-BG" dirty="0"/>
+              <a:rPr lang="bg-BG" b="1" dirty="0">
+                <a:solidFill>
+                  <a:schemeClr val="bg1"/>
+                </a:solidFill>
+              </a:rPr>
               <a:t>без сравнение</a:t>
             </a:r>
-            <a:endParaRPr lang="en-US" dirty="0"/>
+            <a:endParaRPr lang="en-US" b="1" dirty="0">
+              <a:solidFill>
+                <a:schemeClr val="bg1"/>
+              </a:solidFill>
+            </a:endParaRPr>
           </a:p>
         </p:txBody>
       </p:sp>
@@ -30721,7 +30851,7 @@
         </p:spPr>
         <p:txBody>
           <a:bodyPr>
-            <a:normAutofit lnSpcReduction="10000"/>
+            <a:normAutofit/>
           </a:bodyPr>
           <a:lstStyle/>
           <a:p>
@@ -30762,7 +30892,58 @@
             </a:pPr>
             <a:r>
               <a:rPr lang="bg-BG" dirty="0"/>
-              <a:t>Запазване на реда на равните елементи</a:t>
+              <a:t>Ако два елемента са </a:t>
+            </a:r>
+            <a:r>
+              <a:rPr lang="bg-BG" b="1" dirty="0">
+                <a:solidFill>
+                  <a:schemeClr val="bg1"/>
+                </a:solidFill>
+              </a:rPr>
+              <a:t>еднакви</a:t>
+            </a:r>
+            <a:r>
+              <a:rPr lang="bg-BG" dirty="0"/>
+              <a:t>, тяхната позиция се </a:t>
+            </a:r>
+            <a:r>
+              <a:rPr lang="bg-BG" b="1" dirty="0">
+                <a:solidFill>
+                  <a:schemeClr val="bg1"/>
+                </a:solidFill>
+              </a:rPr>
+              <a:t>запазва</a:t>
+            </a:r>
+            <a:endParaRPr lang="en-US" b="1" dirty="0">
+              <a:solidFill>
+                <a:schemeClr val="bg1"/>
+              </a:solidFill>
+            </a:endParaRPr>
+          </a:p>
+          <a:p>
+            <a:pPr>
+              <a:lnSpc>
+                <a:spcPct val="110000"/>
+              </a:lnSpc>
+              <a:buClr>
+                <a:schemeClr val="tx1"/>
+              </a:buClr>
+            </a:pPr>
+            <a:r>
+              <a:rPr lang="bg-BG" b="1" dirty="0">
+                <a:solidFill>
+                  <a:schemeClr val="bg1"/>
+                </a:solidFill>
+              </a:rPr>
+              <a:t>Нестабилни</a:t>
+            </a:r>
+            <a:r>
+              <a:rPr lang="en-US" dirty="0"/>
+              <a:t> </a:t>
+            </a:r>
+            <a:r>
+              <a:rPr lang="bg-BG" dirty="0"/>
+              <a:t>сортиращи алгоритми</a:t>
             </a:r>
             <a:endParaRPr lang="en-US" dirty="0"/>
           </a:p>
@@ -30776,47 +30957,28 @@
               </a:buClr>
             </a:pPr>
             <a:r>
+              <a:rPr lang="bg-BG" b="1" dirty="0">
+                <a:solidFill>
+                  <a:schemeClr val="bg1"/>
+                </a:solidFill>
+              </a:rPr>
+              <a:t>Пренареждане</a:t>
+            </a:r>
+            <a:r>
               <a:rPr lang="bg-BG" dirty="0"/>
-              <a:t>Ако два елемента са еднакви, тяхната позиция се запазва</a:t>
-            </a:r>
-            <a:endParaRPr lang="en-US" dirty="0"/>
-          </a:p>
-          <a:p>
-            <a:pPr>
-              <a:lnSpc>
-                <a:spcPct val="110000"/>
-              </a:lnSpc>
-              <a:buClr>
-                <a:schemeClr val="tx1"/>
-              </a:buClr>
-            </a:pPr>
+              <a:t> на еднаквите елементи в </a:t>
+            </a:r>
             <a:r>
               <a:rPr lang="bg-BG" b="1" dirty="0">
                 <a:solidFill>
                   <a:schemeClr val="bg1"/>
                 </a:solidFill>
               </a:rPr>
-              <a:t>Нестабилни</a:t>
-            </a:r>
-            <a:r>
-              <a:rPr lang="en-US" dirty="0"/>
-              <a:t> </a:t>
+              <a:t>непредсказуем</a:t>
             </a:r>
             <a:r>
               <a:rPr lang="bg-BG" dirty="0"/>
-              <a:t>сортиращи алгоритми</a:t>
-            </a:r>
-            <a:endParaRPr lang="en-US" dirty="0"/>
-          </a:p>
-          <a:p>
-            <a:pPr lvl="1">
-              <a:lnSpc>
-                <a:spcPct val="110000"/>
-              </a:lnSpc>
-            </a:pPr>
-            <a:r>
-              <a:rPr lang="bg-BG" dirty="0"/>
-              <a:t>Пренареждане на еднаквите елементи в непредсказуем ред</a:t>
+              <a:t> ред</a:t>
             </a:r>
           </a:p>
           <a:p>
@@ -31164,55 +31326,6 @@
                       </p:childTnLst>
                     </p:cTn>
                   </p:par>
-                  <p:par>
-                    <p:cTn id="19" fill="hold">
-                      <p:stCondLst>
-                        <p:cond delay="indefinite"/>
-                      </p:stCondLst>
-                      <p:childTnLst>
-                        <p:par>
-                          <p:cTn id="20" fill="hold">
-                            <p:stCondLst>
-                              <p:cond delay="0"/>
-                            </p:stCondLst>
-                            <p:childTnLst>
-                              <p:par>
-                                <p:cTn id="21" presetID="1" presetClass="entr" presetSubtype="0" fill="hold" nodeType="clickEffect">
-                                  <p:stCondLst>
-                                    <p:cond delay="0"/>
-                                  </p:stCondLst>
-                                  <p:childTnLst>
-                                    <p:set>
-                                      <p:cBhvr>
-                                        <p:cTn id="22" dur="1" fill="hold">
-                                          <p:stCondLst>
-                                            <p:cond delay="0"/>
-                                          </p:stCondLst>
-                                        </p:cTn>
-                                        <p:tgtEl>
-                                          <p:spTgt spid="3">
-                                            <p:txEl>
-                                              <p:pRg st="5" end="5"/>
-                                            </p:txEl>
-                                          </p:spTgt>
-                                        </p:tgtEl>
-                                        <p:attrNameLst>
-                                          <p:attrName>style.visibility</p:attrName>
-                                        </p:attrNameLst>
-                                      </p:cBhvr>
-                                      <p:to>
-                                        <p:strVal val="visible"/>
-                                      </p:to>
-                                    </p:set>
-                                  </p:childTnLst>
-                                </p:cTn>
-                              </p:par>
-                            </p:childTnLst>
-                          </p:cTn>
-                        </p:par>
-                      </p:childTnLst>
-                    </p:cTn>
-                  </p:par>
                 </p:childTnLst>
               </p:cTn>
               <p:prevCondLst>
@@ -31516,14 +31629,50 @@
             <a:pPr lvl="1"/>
             <a:r>
               <a:rPr lang="bg-BG" sz="3199" dirty="0"/>
-              <a:t>Размяна на първия елемент с</a:t>
+              <a:t>Размяна на </a:t>
+            </a:r>
+            <a:r>
+              <a:rPr lang="bg-BG" sz="3199" b="1" dirty="0">
+                <a:solidFill>
+                  <a:schemeClr val="bg1"/>
+                </a:solidFill>
+              </a:rPr>
+              <a:t>първия</a:t>
+            </a:r>
+            <a:r>
+              <a:rPr lang="bg-BG" sz="3199" dirty="0"/>
+              <a:t> елемент с</a:t>
             </a:r>
             <a:br>
               <a:rPr lang="bg-BG" sz="3199" dirty="0"/>
             </a:br>
             <a:r>
+              <a:rPr lang="bg-BG" sz="3199" b="1" dirty="0">
+                <a:solidFill>
+                  <a:schemeClr val="bg1"/>
+                </a:solidFill>
+              </a:rPr>
+              <a:t>най-малкия</a:t>
+            </a:r>
+            <a:r>
+              <a:rPr lang="bg-BG" sz="3199" b="1" dirty="0"/>
+              <a:t> </a:t>
+            </a:r>
+            <a:r>
               <a:rPr lang="bg-BG" sz="3199" dirty="0"/>
-              <a:t>най-малкия елемент отдясно и т.н.</a:t>
+              <a:t>елемент </a:t>
+            </a:r>
+            <a:r>
+              <a:rPr lang="bg-BG" sz="3199" b="1" dirty="0">
+                <a:solidFill>
+                  <a:schemeClr val="bg1"/>
+                </a:solidFill>
+              </a:rPr>
+              <a:t>отдясно</a:t>
+            </a:r>
+            <a:r>
+              <a:rPr lang="bg-BG" sz="3199" dirty="0"/>
+              <a:t> и т.н.</a:t>
             </a:r>
             <a:endParaRPr lang="en-US" sz="3199" dirty="0"/>
           </a:p>
@@ -31661,7 +31810,7 @@
             </a:r>
             <a:r>
               <a:rPr lang="bg-BG" sz="3199" dirty="0"/>
-              <a:t> </a:t>
+              <a:t>   </a:t>
             </a:r>
             <a:r>
               <a:rPr lang="en-US" sz="3199" dirty="0">
@@ -31682,8 +31831,12 @@
               <a:t> </a:t>
             </a:r>
             <a:r>
-              <a:rPr lang="en-US" sz="3199" b="1" dirty="0"/>
-              <a:t>Selection</a:t>
+              <a:rPr lang="en-US" sz="3199" b="1" dirty="0">
+                <a:solidFill>
+                  <a:schemeClr val="bg1"/>
+                </a:solidFill>
+              </a:rPr>
+              <a:t>Selection sort</a:t>
             </a:r>
             <a:r>
               <a:rPr lang="en-US" sz="3599" dirty="0"/>
@@ -31692,10 +31845,11 @@
             <a:endParaRPr lang="bg-BG" sz="3599" dirty="0"/>
           </a:p>
           <a:p>
-            <a:pPr>
+            <a:pPr marL="0" indent="0">
               <a:buClr>
                 <a:schemeClr val="tx1"/>
               </a:buClr>
+              <a:buNone/>
             </a:pPr>
             <a:endParaRPr lang="bg-BG" sz="3199" dirty="0"/>
           </a:p>
@@ -31751,7 +31905,7 @@
         </p:blipFill>
         <p:spPr>
           <a:xfrm>
-            <a:off x="2676891" y="6068800"/>
+            <a:off x="2662560" y="6171539"/>
             <a:ext cx="8007914" cy="464392"/>
           </a:xfrm>
           <a:prstGeom prst="rect">
@@ -31834,7 +31988,7 @@
         </p:blipFill>
         <p:spPr>
           <a:xfrm>
-            <a:off x="7905767" y="5036194"/>
+            <a:off x="8257312" y="5027944"/>
             <a:ext cx="2335642" cy="818937"/>
           </a:xfrm>
           <a:prstGeom prst="rect">
@@ -33085,7 +33239,7 @@
             </a:r>
             <a:r>
               <a:rPr lang="bg-BG" dirty="0"/>
-              <a:t>Код</a:t>
+              <a:t>код</a:t>
             </a:r>
             <a:endParaRPr lang="en-US" dirty="0"/>
           </a:p>

</xml_diff>